<commit_message>
Updated the poster/ppt and removed the segmented image view from the GUI
</commit_message>
<xml_diff>
--- a/Posters/PosterTemplate2.pptx
+++ b/Posters/PosterTemplate2.pptx
@@ -7,14 +7,14 @@
   <p:sldIdLst>
     <p:sldId id="256" r:id="rId2"/>
   </p:sldIdLst>
-  <p:sldSz cx="12601575" cy="9001125"/>
+  <p:sldSz cx="14401800" cy="10801350"/>
   <p:notesSz cx="6858000" cy="9144000"/>
   <p:defaultTextStyle>
     <a:defPPr>
       <a:defRPr lang="nl-NL"/>
     </a:defPPr>
-    <a:lvl1pPr marL="0" algn="l" defTabSz="1131570" rtl="0" eaLnBrk="1" latinLnBrk="0" hangingPunct="1">
-      <a:defRPr sz="2200" kern="1200">
+    <a:lvl1pPr marL="0" algn="l" defTabSz="1320090" rtl="0" eaLnBrk="1" latinLnBrk="0" hangingPunct="1">
+      <a:defRPr sz="2600" kern="1200">
         <a:solidFill>
           <a:schemeClr val="tx1"/>
         </a:solidFill>
@@ -23,8 +23,8 @@
         <a:cs typeface="+mn-cs"/>
       </a:defRPr>
     </a:lvl1pPr>
-    <a:lvl2pPr marL="565785" algn="l" defTabSz="1131570" rtl="0" eaLnBrk="1" latinLnBrk="0" hangingPunct="1">
-      <a:defRPr sz="2200" kern="1200">
+    <a:lvl2pPr marL="660045" algn="l" defTabSz="1320090" rtl="0" eaLnBrk="1" latinLnBrk="0" hangingPunct="1">
+      <a:defRPr sz="2600" kern="1200">
         <a:solidFill>
           <a:schemeClr val="tx1"/>
         </a:solidFill>
@@ -33,8 +33,8 @@
         <a:cs typeface="+mn-cs"/>
       </a:defRPr>
     </a:lvl2pPr>
-    <a:lvl3pPr marL="1131570" algn="l" defTabSz="1131570" rtl="0" eaLnBrk="1" latinLnBrk="0" hangingPunct="1">
-      <a:defRPr sz="2200" kern="1200">
+    <a:lvl3pPr marL="1320090" algn="l" defTabSz="1320090" rtl="0" eaLnBrk="1" latinLnBrk="0" hangingPunct="1">
+      <a:defRPr sz="2600" kern="1200">
         <a:solidFill>
           <a:schemeClr val="tx1"/>
         </a:solidFill>
@@ -43,8 +43,8 @@
         <a:cs typeface="+mn-cs"/>
       </a:defRPr>
     </a:lvl3pPr>
-    <a:lvl4pPr marL="1697355" algn="l" defTabSz="1131570" rtl="0" eaLnBrk="1" latinLnBrk="0" hangingPunct="1">
-      <a:defRPr sz="2200" kern="1200">
+    <a:lvl4pPr marL="1980134" algn="l" defTabSz="1320090" rtl="0" eaLnBrk="1" latinLnBrk="0" hangingPunct="1">
+      <a:defRPr sz="2600" kern="1200">
         <a:solidFill>
           <a:schemeClr val="tx1"/>
         </a:solidFill>
@@ -53,8 +53,8 @@
         <a:cs typeface="+mn-cs"/>
       </a:defRPr>
     </a:lvl4pPr>
-    <a:lvl5pPr marL="2263140" algn="l" defTabSz="1131570" rtl="0" eaLnBrk="1" latinLnBrk="0" hangingPunct="1">
-      <a:defRPr sz="2200" kern="1200">
+    <a:lvl5pPr marL="2640179" algn="l" defTabSz="1320090" rtl="0" eaLnBrk="1" latinLnBrk="0" hangingPunct="1">
+      <a:defRPr sz="2600" kern="1200">
         <a:solidFill>
           <a:schemeClr val="tx1"/>
         </a:solidFill>
@@ -63,8 +63,8 @@
         <a:cs typeface="+mn-cs"/>
       </a:defRPr>
     </a:lvl5pPr>
-    <a:lvl6pPr marL="2828925" algn="l" defTabSz="1131570" rtl="0" eaLnBrk="1" latinLnBrk="0" hangingPunct="1">
-      <a:defRPr sz="2200" kern="1200">
+    <a:lvl6pPr marL="3300224" algn="l" defTabSz="1320090" rtl="0" eaLnBrk="1" latinLnBrk="0" hangingPunct="1">
+      <a:defRPr sz="2600" kern="1200">
         <a:solidFill>
           <a:schemeClr val="tx1"/>
         </a:solidFill>
@@ -73,8 +73,8 @@
         <a:cs typeface="+mn-cs"/>
       </a:defRPr>
     </a:lvl6pPr>
-    <a:lvl7pPr marL="3394710" algn="l" defTabSz="1131570" rtl="0" eaLnBrk="1" latinLnBrk="0" hangingPunct="1">
-      <a:defRPr sz="2200" kern="1200">
+    <a:lvl7pPr marL="3960269" algn="l" defTabSz="1320090" rtl="0" eaLnBrk="1" latinLnBrk="0" hangingPunct="1">
+      <a:defRPr sz="2600" kern="1200">
         <a:solidFill>
           <a:schemeClr val="tx1"/>
         </a:solidFill>
@@ -83,8 +83,8 @@
         <a:cs typeface="+mn-cs"/>
       </a:defRPr>
     </a:lvl7pPr>
-    <a:lvl8pPr marL="3960495" algn="l" defTabSz="1131570" rtl="0" eaLnBrk="1" latinLnBrk="0" hangingPunct="1">
-      <a:defRPr sz="2200" kern="1200">
+    <a:lvl8pPr marL="4620313" algn="l" defTabSz="1320090" rtl="0" eaLnBrk="1" latinLnBrk="0" hangingPunct="1">
+      <a:defRPr sz="2600" kern="1200">
         <a:solidFill>
           <a:schemeClr val="tx1"/>
         </a:solidFill>
@@ -93,8 +93,8 @@
         <a:cs typeface="+mn-cs"/>
       </a:defRPr>
     </a:lvl8pPr>
-    <a:lvl9pPr marL="4526280" algn="l" defTabSz="1131570" rtl="0" eaLnBrk="1" latinLnBrk="0" hangingPunct="1">
-      <a:defRPr sz="2200" kern="1200">
+    <a:lvl9pPr marL="5280358" algn="l" defTabSz="1320090" rtl="0" eaLnBrk="1" latinLnBrk="0" hangingPunct="1">
+      <a:defRPr sz="2600" kern="1200">
         <a:solidFill>
           <a:schemeClr val="tx1"/>
         </a:solidFill>
@@ -132,8 +132,8 @@
         </p:nvSpPr>
         <p:spPr>
           <a:xfrm>
-            <a:off x="2" y="1"/>
-            <a:ext cx="1037005" cy="9001125"/>
+            <a:off x="3" y="2"/>
+            <a:ext cx="1185149" cy="10801350"/>
           </a:xfrm>
           <a:prstGeom prst="rect">
             <a:avLst/>
@@ -185,7 +185,7 @@
           </a:fontRef>
         </p:style>
         <p:txBody>
-          <a:bodyPr lIns="113157" tIns="56579" rIns="113157" bIns="56579" rtlCol="0" anchor="ctr"/>
+          <a:bodyPr lIns="132009" tIns="66005" rIns="132009" bIns="66005" rtlCol="0" anchor="ctr"/>
           <a:lstStyle/>
           <a:p>
             <a:pPr algn="ctr"/>
@@ -213,15 +213,15 @@
         </p:nvSpPr>
         <p:spPr>
           <a:xfrm>
-            <a:off x="1676011" y="1663575"/>
-            <a:ext cx="9972087" cy="6737477"/>
+            <a:off x="1915442" y="1996291"/>
+            <a:ext cx="11396671" cy="8084972"/>
           </a:xfrm>
         </p:spPr>
         <p:txBody>
           <a:bodyPr/>
           <a:lstStyle>
             <a:lvl1pPr>
-              <a:defRPr sz="14200"/>
+              <a:defRPr sz="16600"/>
             </a:lvl1pPr>
           </a:lstStyle>
           <a:p>
@@ -245,8 +245,8 @@
         </p:nvSpPr>
         <p:spPr>
           <a:xfrm>
-            <a:off x="1676010" y="264736"/>
-            <a:ext cx="8530019" cy="1246309"/>
+            <a:off x="1915441" y="317684"/>
+            <a:ext cx="9748593" cy="1495571"/>
           </a:xfrm>
         </p:spPr>
         <p:txBody>
@@ -256,7 +256,7 @@
           <a:lstStyle>
             <a:lvl1pPr marL="0" indent="0" algn="r">
               <a:buNone/>
-              <a:defRPr sz="3000">
+              <a:defRPr sz="3500">
                 <a:solidFill>
                   <a:schemeClr val="tx2">
                     <a:lumMod val="60000"/>
@@ -265,7 +265,7 @@
                 </a:solidFill>
               </a:defRPr>
             </a:lvl1pPr>
-            <a:lvl2pPr marL="565785" indent="0" algn="ctr">
+            <a:lvl2pPr marL="660045" indent="0" algn="ctr">
               <a:buNone/>
               <a:defRPr>
                 <a:solidFill>
@@ -275,7 +275,7 @@
                 </a:solidFill>
               </a:defRPr>
             </a:lvl2pPr>
-            <a:lvl3pPr marL="1131570" indent="0" algn="ctr">
+            <a:lvl3pPr marL="1320090" indent="0" algn="ctr">
               <a:buNone/>
               <a:defRPr>
                 <a:solidFill>
@@ -285,7 +285,7 @@
                 </a:solidFill>
               </a:defRPr>
             </a:lvl3pPr>
-            <a:lvl4pPr marL="1697355" indent="0" algn="ctr">
+            <a:lvl4pPr marL="1980134" indent="0" algn="ctr">
               <a:buNone/>
               <a:defRPr>
                 <a:solidFill>
@@ -295,7 +295,7 @@
                 </a:solidFill>
               </a:defRPr>
             </a:lvl4pPr>
-            <a:lvl5pPr marL="2263140" indent="0" algn="ctr">
+            <a:lvl5pPr marL="2640179" indent="0" algn="ctr">
               <a:buNone/>
               <a:defRPr>
                 <a:solidFill>
@@ -305,7 +305,7 @@
                 </a:solidFill>
               </a:defRPr>
             </a:lvl5pPr>
-            <a:lvl6pPr marL="2828925" indent="0" algn="ctr">
+            <a:lvl6pPr marL="3300224" indent="0" algn="ctr">
               <a:buNone/>
               <a:defRPr>
                 <a:solidFill>
@@ -315,7 +315,7 @@
                 </a:solidFill>
               </a:defRPr>
             </a:lvl6pPr>
-            <a:lvl7pPr marL="3394710" indent="0" algn="ctr">
+            <a:lvl7pPr marL="3960269" indent="0" algn="ctr">
               <a:buNone/>
               <a:defRPr>
                 <a:solidFill>
@@ -325,7 +325,7 @@
                 </a:solidFill>
               </a:defRPr>
             </a:lvl7pPr>
-            <a:lvl8pPr marL="3960495" indent="0" algn="ctr">
+            <a:lvl8pPr marL="4620313" indent="0" algn="ctr">
               <a:buNone/>
               <a:defRPr>
                 <a:solidFill>
@@ -335,7 +335,7 @@
                 </a:solidFill>
               </a:defRPr>
             </a:lvl8pPr>
-            <a:lvl9pPr marL="4526280" indent="0" algn="ctr">
+            <a:lvl9pPr marL="5280358" indent="0" algn="ctr">
               <a:buNone/>
               <a:defRPr>
                 <a:solidFill>
@@ -410,15 +410,15 @@
         </p:nvSpPr>
         <p:spPr>
           <a:xfrm>
-            <a:off x="11232366" y="310296"/>
-            <a:ext cx="1082243" cy="479227"/>
+            <a:off x="12836990" y="372356"/>
+            <a:ext cx="1236849" cy="575072"/>
           </a:xfrm>
         </p:spPr>
         <p:txBody>
           <a:bodyPr/>
           <a:lstStyle>
             <a:lvl1pPr>
-              <a:defRPr sz="1700"/>
+              <a:defRPr sz="2000"/>
             </a:lvl1pPr>
           </a:lstStyle>
           <a:p>
@@ -439,8 +439,8 @@
         </p:nvGrpSpPr>
         <p:grpSpPr>
           <a:xfrm>
-            <a:off x="10291287" y="275034"/>
-            <a:ext cx="905739" cy="566738"/>
+            <a:off x="11761472" y="330041"/>
+            <a:ext cx="1035130" cy="680086"/>
             <a:chOff x="7467600" y="209550"/>
             <a:chExt cx="657226" cy="431800"/>
           </a:xfrm>
@@ -1079,8 +1079,8 @@
         </p:nvSpPr>
         <p:spPr>
           <a:xfrm>
-            <a:off x="9136142" y="360464"/>
-            <a:ext cx="2835355" cy="7680127"/>
+            <a:off x="10441306" y="432558"/>
+            <a:ext cx="3240406" cy="9216152"/>
           </a:xfrm>
         </p:spPr>
         <p:txBody>
@@ -1107,8 +1107,8 @@
         </p:nvSpPr>
         <p:spPr>
           <a:xfrm>
-            <a:off x="630079" y="360464"/>
-            <a:ext cx="8296037" cy="7680127"/>
+            <a:off x="720091" y="432558"/>
+            <a:ext cx="9481185" cy="9216152"/>
           </a:xfrm>
         </p:spPr>
         <p:txBody>
@@ -1263,8 +1263,8 @@
         </p:nvSpPr>
         <p:spPr>
           <a:xfrm>
-            <a:off x="1680211" y="6900862"/>
-            <a:ext cx="9976247" cy="1500188"/>
+            <a:off x="1920242" y="8281034"/>
+            <a:ext cx="11401425" cy="1800226"/>
           </a:xfrm>
         </p:spPr>
         <p:txBody>
@@ -1273,7 +1273,7 @@
           </a:bodyPr>
           <a:lstStyle>
             <a:lvl1pPr algn="l">
-              <a:defRPr sz="8900" baseline="0">
+              <a:defRPr sz="10400" baseline="0">
                 <a:ln w="12700">
                   <a:solidFill>
                     <a:schemeClr val="tx2"/>
@@ -1303,8 +1303,8 @@
         </p:nvSpPr>
         <p:spPr>
           <a:xfrm>
-            <a:off x="1680211" y="1100139"/>
-            <a:ext cx="10291287" cy="5800725"/>
+            <a:off x="1920242" y="1320167"/>
+            <a:ext cx="11761471" cy="6960870"/>
           </a:xfrm>
         </p:spPr>
         <p:txBody>
@@ -1313,31 +1313,31 @@
           </a:bodyPr>
           <a:lstStyle>
             <a:lvl1pPr>
-              <a:defRPr sz="3500"/>
+              <a:defRPr sz="4100"/>
             </a:lvl1pPr>
             <a:lvl2pPr>
-              <a:defRPr sz="2200">
+              <a:defRPr sz="2600">
                 <a:solidFill>
                   <a:schemeClr val="tx1"/>
                 </a:solidFill>
               </a:defRPr>
             </a:lvl2pPr>
             <a:lvl3pPr>
-              <a:defRPr sz="2200">
+              <a:defRPr sz="2600">
                 <a:solidFill>
                   <a:schemeClr val="tx1"/>
                 </a:solidFill>
               </a:defRPr>
             </a:lvl3pPr>
             <a:lvl4pPr>
-              <a:defRPr sz="2200">
+              <a:defRPr sz="2600">
                 <a:solidFill>
                   <a:schemeClr val="tx1"/>
                 </a:solidFill>
               </a:defRPr>
             </a:lvl4pPr>
             <a:lvl5pPr>
-              <a:defRPr sz="2200">
+              <a:defRPr sz="2600">
                 <a:solidFill>
                   <a:schemeClr val="tx1"/>
                 </a:solidFill>
@@ -1493,8 +1493,8 @@
         </p:nvSpPr>
         <p:spPr>
           <a:xfrm>
-            <a:off x="1680209" y="5885356"/>
-            <a:ext cx="9976248" cy="1000125"/>
+            <a:off x="1920239" y="7062428"/>
+            <a:ext cx="11401426" cy="1200150"/>
           </a:xfrm>
         </p:spPr>
         <p:txBody>
@@ -1502,15 +1502,15 @@
           <a:lstStyle>
             <a:lvl1pPr marL="0" indent="0">
               <a:buNone/>
-              <a:defRPr sz="2500">
+              <a:defRPr sz="2900">
                 <a:solidFill>
                   <a:schemeClr val="tx1"/>
                 </a:solidFill>
               </a:defRPr>
             </a:lvl1pPr>
-            <a:lvl2pPr marL="565785" indent="0">
-              <a:buNone/>
-              <a:defRPr sz="2200">
+            <a:lvl2pPr marL="660045" indent="0">
+              <a:buNone/>
+              <a:defRPr sz="2600">
                 <a:solidFill>
                   <a:schemeClr val="tx1">
                     <a:tint val="75000"/>
@@ -1518,7 +1518,17 @@
                 </a:solidFill>
               </a:defRPr>
             </a:lvl2pPr>
-            <a:lvl3pPr marL="1131570" indent="0">
+            <a:lvl3pPr marL="1320090" indent="0">
+              <a:buNone/>
+              <a:defRPr sz="2300">
+                <a:solidFill>
+                  <a:schemeClr val="tx1">
+                    <a:tint val="75000"/>
+                  </a:schemeClr>
+                </a:solidFill>
+              </a:defRPr>
+            </a:lvl3pPr>
+            <a:lvl4pPr marL="1980134" indent="0">
               <a:buNone/>
               <a:defRPr sz="2000">
                 <a:solidFill>
@@ -1527,20 +1537,10 @@
                   </a:schemeClr>
                 </a:solidFill>
               </a:defRPr>
-            </a:lvl3pPr>
-            <a:lvl4pPr marL="1697355" indent="0">
-              <a:buNone/>
-              <a:defRPr sz="1700">
-                <a:solidFill>
-                  <a:schemeClr val="tx1">
-                    <a:tint val="75000"/>
-                  </a:schemeClr>
-                </a:solidFill>
-              </a:defRPr>
             </a:lvl4pPr>
-            <a:lvl5pPr marL="2263140" indent="0">
-              <a:buNone/>
-              <a:defRPr sz="1700">
+            <a:lvl5pPr marL="2640179" indent="0">
+              <a:buNone/>
+              <a:defRPr sz="2000">
                 <a:solidFill>
                   <a:schemeClr val="tx1">
                     <a:tint val="75000"/>
@@ -1548,9 +1548,9 @@
                 </a:solidFill>
               </a:defRPr>
             </a:lvl5pPr>
-            <a:lvl6pPr marL="2828925" indent="0">
-              <a:buNone/>
-              <a:defRPr sz="1700">
+            <a:lvl6pPr marL="3300224" indent="0">
+              <a:buNone/>
+              <a:defRPr sz="2000">
                 <a:solidFill>
                   <a:schemeClr val="tx1">
                     <a:tint val="75000"/>
@@ -1558,9 +1558,9 @@
                 </a:solidFill>
               </a:defRPr>
             </a:lvl6pPr>
-            <a:lvl7pPr marL="3394710" indent="0">
-              <a:buNone/>
-              <a:defRPr sz="1700">
+            <a:lvl7pPr marL="3960269" indent="0">
+              <a:buNone/>
+              <a:defRPr sz="2000">
                 <a:solidFill>
                   <a:schemeClr val="tx1">
                     <a:tint val="75000"/>
@@ -1568,9 +1568,9 @@
                 </a:solidFill>
               </a:defRPr>
             </a:lvl7pPr>
-            <a:lvl8pPr marL="3960495" indent="0">
-              <a:buNone/>
-              <a:defRPr sz="1700">
+            <a:lvl8pPr marL="4620313" indent="0">
+              <a:buNone/>
+              <a:defRPr sz="2000">
                 <a:solidFill>
                   <a:schemeClr val="tx1">
                     <a:tint val="75000"/>
@@ -1578,9 +1578,9 @@
                 </a:solidFill>
               </a:defRPr>
             </a:lvl8pPr>
-            <a:lvl9pPr marL="4526280" indent="0">
-              <a:buNone/>
-              <a:defRPr sz="1700">
+            <a:lvl9pPr marL="5280358" indent="0">
+              <a:buNone/>
+              <a:defRPr sz="2000">
                 <a:solidFill>
                   <a:schemeClr val="tx1">
                     <a:tint val="75000"/>
@@ -1610,8 +1610,8 @@
         </p:nvSpPr>
         <p:spPr>
           <a:xfrm>
-            <a:off x="1680211" y="6900862"/>
-            <a:ext cx="9976247" cy="1500188"/>
+            <a:off x="1920242" y="8281034"/>
+            <a:ext cx="11401425" cy="1800226"/>
           </a:xfrm>
         </p:spPr>
         <p:txBody>
@@ -1620,7 +1620,7 @@
           </a:bodyPr>
           <a:lstStyle>
             <a:lvl1pPr algn="l">
-              <a:defRPr sz="8900" baseline="0">
+              <a:defRPr sz="10400" baseline="0">
                 <a:ln w="12700">
                   <a:solidFill>
                     <a:schemeClr val="tx2"/>
@@ -1843,8 +1843,8 @@
         </p:nvSpPr>
         <p:spPr>
           <a:xfrm>
-            <a:off x="1676009" y="1104138"/>
-            <a:ext cx="5141443" cy="5760720"/>
+            <a:off x="1915439" y="1324966"/>
+            <a:ext cx="5875935" cy="6912864"/>
           </a:xfrm>
         </p:spPr>
         <p:txBody>
@@ -1900,8 +1900,8 @@
         </p:nvSpPr>
         <p:spPr>
           <a:xfrm>
-            <a:off x="7031679" y="1104138"/>
-            <a:ext cx="5141443" cy="5760720"/>
+            <a:off x="8036205" y="1324966"/>
+            <a:ext cx="5875935" cy="6912864"/>
           </a:xfrm>
         </p:spPr>
         <p:txBody>
@@ -2016,8 +2016,8 @@
         </p:nvSpPr>
         <p:spPr>
           <a:xfrm>
-            <a:off x="1680211" y="1104138"/>
-            <a:ext cx="5145643" cy="700088"/>
+            <a:off x="1920242" y="1324965"/>
+            <a:ext cx="5880735" cy="840106"/>
           </a:xfrm>
         </p:spPr>
         <p:txBody>
@@ -2027,39 +2027,39 @@
           <a:lstStyle>
             <a:lvl1pPr marL="0" indent="0">
               <a:buNone/>
-              <a:defRPr sz="2200" b="1"/>
+              <a:defRPr sz="2600" b="1"/>
             </a:lvl1pPr>
-            <a:lvl2pPr marL="565785" indent="0">
-              <a:buNone/>
-              <a:defRPr sz="2500" b="1"/>
+            <a:lvl2pPr marL="660045" indent="0">
+              <a:buNone/>
+              <a:defRPr sz="2900" b="1"/>
             </a:lvl2pPr>
-            <a:lvl3pPr marL="1131570" indent="0">
-              <a:buNone/>
-              <a:defRPr sz="2200" b="1"/>
+            <a:lvl3pPr marL="1320090" indent="0">
+              <a:buNone/>
+              <a:defRPr sz="2600" b="1"/>
             </a:lvl3pPr>
-            <a:lvl4pPr marL="1697355" indent="0">
-              <a:buNone/>
-              <a:defRPr sz="2000" b="1"/>
+            <a:lvl4pPr marL="1980134" indent="0">
+              <a:buNone/>
+              <a:defRPr sz="2300" b="1"/>
             </a:lvl4pPr>
-            <a:lvl5pPr marL="2263140" indent="0">
-              <a:buNone/>
-              <a:defRPr sz="2000" b="1"/>
+            <a:lvl5pPr marL="2640179" indent="0">
+              <a:buNone/>
+              <a:defRPr sz="2300" b="1"/>
             </a:lvl5pPr>
-            <a:lvl6pPr marL="2828925" indent="0">
-              <a:buNone/>
-              <a:defRPr sz="2000" b="1"/>
+            <a:lvl6pPr marL="3300224" indent="0">
+              <a:buNone/>
+              <a:defRPr sz="2300" b="1"/>
             </a:lvl6pPr>
-            <a:lvl7pPr marL="3394710" indent="0">
-              <a:buNone/>
-              <a:defRPr sz="2000" b="1"/>
+            <a:lvl7pPr marL="3960269" indent="0">
+              <a:buNone/>
+              <a:defRPr sz="2300" b="1"/>
             </a:lvl7pPr>
-            <a:lvl8pPr marL="3960495" indent="0">
-              <a:buNone/>
-              <a:defRPr sz="2000" b="1"/>
+            <a:lvl8pPr marL="4620313" indent="0">
+              <a:buNone/>
+              <a:defRPr sz="2300" b="1"/>
             </a:lvl8pPr>
-            <a:lvl9pPr marL="4526280" indent="0">
-              <a:buNone/>
-              <a:defRPr sz="2000" b="1"/>
+            <a:lvl9pPr marL="5280358" indent="0">
+              <a:buNone/>
+              <a:defRPr sz="2300" b="1"/>
             </a:lvl9pPr>
           </a:lstStyle>
           <a:p>
@@ -2083,8 +2083,8 @@
         </p:nvSpPr>
         <p:spPr>
           <a:xfrm>
-            <a:off x="7035880" y="1104138"/>
-            <a:ext cx="5147665" cy="700088"/>
+            <a:off x="8041006" y="1324965"/>
+            <a:ext cx="5883046" cy="840106"/>
           </a:xfrm>
         </p:spPr>
         <p:txBody>
@@ -2094,39 +2094,39 @@
           <a:lstStyle>
             <a:lvl1pPr marL="0" indent="0">
               <a:buNone/>
-              <a:defRPr sz="2200" b="1"/>
+              <a:defRPr sz="2600" b="1"/>
             </a:lvl1pPr>
-            <a:lvl2pPr marL="565785" indent="0">
-              <a:buNone/>
-              <a:defRPr sz="2500" b="1"/>
+            <a:lvl2pPr marL="660045" indent="0">
+              <a:buNone/>
+              <a:defRPr sz="2900" b="1"/>
             </a:lvl2pPr>
-            <a:lvl3pPr marL="1131570" indent="0">
-              <a:buNone/>
-              <a:defRPr sz="2200" b="1"/>
+            <a:lvl3pPr marL="1320090" indent="0">
+              <a:buNone/>
+              <a:defRPr sz="2600" b="1"/>
             </a:lvl3pPr>
-            <a:lvl4pPr marL="1697355" indent="0">
-              <a:buNone/>
-              <a:defRPr sz="2000" b="1"/>
+            <a:lvl4pPr marL="1980134" indent="0">
+              <a:buNone/>
+              <a:defRPr sz="2300" b="1"/>
             </a:lvl4pPr>
-            <a:lvl5pPr marL="2263140" indent="0">
-              <a:buNone/>
-              <a:defRPr sz="2000" b="1"/>
+            <a:lvl5pPr marL="2640179" indent="0">
+              <a:buNone/>
+              <a:defRPr sz="2300" b="1"/>
             </a:lvl5pPr>
-            <a:lvl6pPr marL="2828925" indent="0">
-              <a:buNone/>
-              <a:defRPr sz="2000" b="1"/>
+            <a:lvl6pPr marL="3300224" indent="0">
+              <a:buNone/>
+              <a:defRPr sz="2300" b="1"/>
             </a:lvl6pPr>
-            <a:lvl7pPr marL="3394710" indent="0">
-              <a:buNone/>
-              <a:defRPr sz="2000" b="1"/>
+            <a:lvl7pPr marL="3960269" indent="0">
+              <a:buNone/>
+              <a:defRPr sz="2300" b="1"/>
             </a:lvl7pPr>
-            <a:lvl8pPr marL="3960495" indent="0">
-              <a:buNone/>
-              <a:defRPr sz="2000" b="1"/>
+            <a:lvl8pPr marL="4620313" indent="0">
+              <a:buNone/>
+              <a:defRPr sz="2300" b="1"/>
             </a:lvl8pPr>
-            <a:lvl9pPr marL="4526280" indent="0">
-              <a:buNone/>
-              <a:defRPr sz="2000" b="1"/>
+            <a:lvl9pPr marL="5280358" indent="0">
+              <a:buNone/>
+              <a:defRPr sz="2300" b="1"/>
             </a:lvl9pPr>
           </a:lstStyle>
           <a:p>
@@ -2217,8 +2217,8 @@
         </p:nvSpPr>
         <p:spPr>
           <a:xfrm>
-            <a:off x="1676009" y="1812227"/>
-            <a:ext cx="5141443" cy="5040630"/>
+            <a:off x="1915439" y="2174672"/>
+            <a:ext cx="5875935" cy="6048756"/>
           </a:xfrm>
         </p:spPr>
         <p:txBody>
@@ -2274,8 +2274,8 @@
         </p:nvSpPr>
         <p:spPr>
           <a:xfrm>
-            <a:off x="7031679" y="1812225"/>
-            <a:ext cx="5141443" cy="5040630"/>
+            <a:off x="8036205" y="2174670"/>
+            <a:ext cx="5875935" cy="6048756"/>
           </a:xfrm>
         </p:spPr>
         <p:txBody>
@@ -2588,15 +2588,15 @@
         </p:nvSpPr>
         <p:spPr>
           <a:xfrm>
-            <a:off x="7875985" y="518815"/>
-            <a:ext cx="4145832" cy="1525191"/>
+            <a:off x="9001126" y="622579"/>
+            <a:ext cx="4738094" cy="1830229"/>
           </a:xfrm>
         </p:spPr>
         <p:txBody>
           <a:bodyPr anchor="b"/>
           <a:lstStyle>
             <a:lvl1pPr algn="l">
-              <a:defRPr sz="2500" b="1">
+              <a:defRPr sz="2900" b="1">
                 <a:ln>
                   <a:noFill/>
                 </a:ln>
@@ -2628,8 +2628,8 @@
         </p:nvSpPr>
         <p:spPr>
           <a:xfrm>
-            <a:off x="7875985" y="2044006"/>
-            <a:ext cx="4145832" cy="5756970"/>
+            <a:off x="9001126" y="2452807"/>
+            <a:ext cx="4738094" cy="6908364"/>
           </a:xfrm>
         </p:spPr>
         <p:txBody>
@@ -2637,7 +2637,7 @@
           <a:lstStyle>
             <a:lvl1pPr marL="0" indent="0">
               <a:buNone/>
-              <a:defRPr sz="1700">
+              <a:defRPr sz="2000">
                 <a:solidFill>
                   <a:schemeClr val="tx1">
                     <a:lumMod val="50000"/>
@@ -2646,37 +2646,37 @@
                 </a:solidFill>
               </a:defRPr>
             </a:lvl1pPr>
-            <a:lvl2pPr marL="565785" indent="0">
-              <a:buNone/>
-              <a:defRPr sz="1500"/>
+            <a:lvl2pPr marL="660045" indent="0">
+              <a:buNone/>
+              <a:defRPr sz="1700"/>
             </a:lvl2pPr>
-            <a:lvl3pPr marL="1131570" indent="0">
-              <a:buNone/>
-              <a:defRPr sz="1200"/>
+            <a:lvl3pPr marL="1320090" indent="0">
+              <a:buNone/>
+              <a:defRPr sz="1400"/>
             </a:lvl3pPr>
-            <a:lvl4pPr marL="1697355" indent="0">
-              <a:buNone/>
-              <a:defRPr sz="1100"/>
+            <a:lvl4pPr marL="1980134" indent="0">
+              <a:buNone/>
+              <a:defRPr sz="1300"/>
             </a:lvl4pPr>
-            <a:lvl5pPr marL="2263140" indent="0">
-              <a:buNone/>
-              <a:defRPr sz="1100"/>
+            <a:lvl5pPr marL="2640179" indent="0">
+              <a:buNone/>
+              <a:defRPr sz="1300"/>
             </a:lvl5pPr>
-            <a:lvl6pPr marL="2828925" indent="0">
-              <a:buNone/>
-              <a:defRPr sz="1100"/>
+            <a:lvl6pPr marL="3300224" indent="0">
+              <a:buNone/>
+              <a:defRPr sz="1300"/>
             </a:lvl6pPr>
-            <a:lvl7pPr marL="3394710" indent="0">
-              <a:buNone/>
-              <a:defRPr sz="1100"/>
+            <a:lvl7pPr marL="3960269" indent="0">
+              <a:buNone/>
+              <a:defRPr sz="1300"/>
             </a:lvl7pPr>
-            <a:lvl8pPr marL="3960495" indent="0">
-              <a:buNone/>
-              <a:defRPr sz="1100"/>
+            <a:lvl8pPr marL="4620313" indent="0">
+              <a:buNone/>
+              <a:defRPr sz="1300"/>
             </a:lvl8pPr>
-            <a:lvl9pPr marL="4526280" indent="0">
-              <a:buNone/>
-              <a:defRPr sz="1100"/>
+            <a:lvl9pPr marL="5280358" indent="0">
+              <a:buNone/>
+              <a:defRPr sz="1300"/>
             </a:lvl9pPr>
           </a:lstStyle>
           <a:p>
@@ -2700,8 +2700,8 @@
         </p:nvSpPr>
         <p:spPr>
           <a:xfrm>
-            <a:off x="1260158" y="500064"/>
-            <a:ext cx="6615827" cy="7800975"/>
+            <a:off x="1440181" y="600077"/>
+            <a:ext cx="7560945" cy="9361170"/>
           </a:xfrm>
         </p:spPr>
         <p:txBody>
@@ -2856,15 +2856,15 @@
         </p:nvSpPr>
         <p:spPr>
           <a:xfrm>
-            <a:off x="1680210" y="6069991"/>
-            <a:ext cx="7560945" cy="530835"/>
+            <a:off x="1920241" y="7283990"/>
+            <a:ext cx="8641080" cy="637002"/>
           </a:xfrm>
         </p:spPr>
         <p:txBody>
           <a:bodyPr bIns="0" anchor="b"/>
           <a:lstStyle>
             <a:lvl1pPr algn="l">
-              <a:defRPr sz="2500" b="1">
+              <a:defRPr sz="2900" b="1">
                 <a:ln w="12700">
                   <a:noFill/>
                 </a:ln>
@@ -2896,8 +2896,8 @@
         </p:nvSpPr>
         <p:spPr>
           <a:xfrm>
-            <a:off x="1824604" y="500063"/>
-            <a:ext cx="8086010" cy="5356919"/>
+            <a:off x="2085262" y="600076"/>
+            <a:ext cx="9241154" cy="6428303"/>
           </a:xfrm>
         </p:spPr>
         <p:txBody>
@@ -2905,39 +2905,39 @@
           <a:lstStyle>
             <a:lvl1pPr marL="0" indent="0">
               <a:buNone/>
-              <a:defRPr sz="4000"/>
+              <a:defRPr sz="4700"/>
             </a:lvl1pPr>
-            <a:lvl2pPr marL="565785" indent="0">
+            <a:lvl2pPr marL="660045" indent="0">
+              <a:buNone/>
+              <a:defRPr sz="4100"/>
+            </a:lvl2pPr>
+            <a:lvl3pPr marL="1320090" indent="0">
               <a:buNone/>
               <a:defRPr sz="3500"/>
-            </a:lvl2pPr>
-            <a:lvl3pPr marL="1131570" indent="0">
-              <a:buNone/>
-              <a:defRPr sz="3000"/>
             </a:lvl3pPr>
-            <a:lvl4pPr marL="1697355" indent="0">
-              <a:buNone/>
-              <a:defRPr sz="2500"/>
+            <a:lvl4pPr marL="1980134" indent="0">
+              <a:buNone/>
+              <a:defRPr sz="2900"/>
             </a:lvl4pPr>
-            <a:lvl5pPr marL="2263140" indent="0">
-              <a:buNone/>
-              <a:defRPr sz="2500"/>
+            <a:lvl5pPr marL="2640179" indent="0">
+              <a:buNone/>
+              <a:defRPr sz="2900"/>
             </a:lvl5pPr>
-            <a:lvl6pPr marL="2828925" indent="0">
-              <a:buNone/>
-              <a:defRPr sz="2500"/>
+            <a:lvl6pPr marL="3300224" indent="0">
+              <a:buNone/>
+              <a:defRPr sz="2900"/>
             </a:lvl6pPr>
-            <a:lvl7pPr marL="3394710" indent="0">
-              <a:buNone/>
-              <a:defRPr sz="2500"/>
+            <a:lvl7pPr marL="3960269" indent="0">
+              <a:buNone/>
+              <a:defRPr sz="2900"/>
             </a:lvl7pPr>
-            <a:lvl8pPr marL="3960495" indent="0">
-              <a:buNone/>
-              <a:defRPr sz="2500"/>
+            <a:lvl8pPr marL="4620313" indent="0">
+              <a:buNone/>
+              <a:defRPr sz="2900"/>
             </a:lvl8pPr>
-            <a:lvl9pPr marL="4526280" indent="0">
-              <a:buNone/>
-              <a:defRPr sz="2500"/>
+            <a:lvl9pPr marL="5280358" indent="0">
+              <a:buNone/>
+              <a:defRPr sz="2900"/>
             </a:lvl9pPr>
           </a:lstStyle>
           <a:p>
@@ -2961,8 +2961,8 @@
         </p:nvSpPr>
         <p:spPr>
           <a:xfrm>
-            <a:off x="1680210" y="6600826"/>
-            <a:ext cx="5565695" cy="1800225"/>
+            <a:off x="1920241" y="7920992"/>
+            <a:ext cx="6360794" cy="2160270"/>
           </a:xfrm>
         </p:spPr>
         <p:txBody>
@@ -2970,43 +2970,43 @@
           <a:lstStyle>
             <a:lvl1pPr marL="0" indent="0">
               <a:buNone/>
-              <a:defRPr sz="1700">
+              <a:defRPr sz="2000">
                 <a:solidFill>
                   <a:schemeClr val="tx1"/>
                 </a:solidFill>
               </a:defRPr>
             </a:lvl1pPr>
-            <a:lvl2pPr marL="565785" indent="0">
-              <a:buNone/>
-              <a:defRPr sz="1500"/>
+            <a:lvl2pPr marL="660045" indent="0">
+              <a:buNone/>
+              <a:defRPr sz="1700"/>
             </a:lvl2pPr>
-            <a:lvl3pPr marL="1131570" indent="0">
-              <a:buNone/>
-              <a:defRPr sz="1200"/>
+            <a:lvl3pPr marL="1320090" indent="0">
+              <a:buNone/>
+              <a:defRPr sz="1400"/>
             </a:lvl3pPr>
-            <a:lvl4pPr marL="1697355" indent="0">
-              <a:buNone/>
-              <a:defRPr sz="1100"/>
+            <a:lvl4pPr marL="1980134" indent="0">
+              <a:buNone/>
+              <a:defRPr sz="1300"/>
             </a:lvl4pPr>
-            <a:lvl5pPr marL="2263140" indent="0">
-              <a:buNone/>
-              <a:defRPr sz="1100"/>
+            <a:lvl5pPr marL="2640179" indent="0">
+              <a:buNone/>
+              <a:defRPr sz="1300"/>
             </a:lvl5pPr>
-            <a:lvl6pPr marL="2828925" indent="0">
-              <a:buNone/>
-              <a:defRPr sz="1100"/>
+            <a:lvl6pPr marL="3300224" indent="0">
+              <a:buNone/>
+              <a:defRPr sz="1300"/>
             </a:lvl6pPr>
-            <a:lvl7pPr marL="3394710" indent="0">
-              <a:buNone/>
-              <a:defRPr sz="1100"/>
+            <a:lvl7pPr marL="3960269" indent="0">
+              <a:buNone/>
+              <a:defRPr sz="1300"/>
             </a:lvl7pPr>
-            <a:lvl8pPr marL="3960495" indent="0">
-              <a:buNone/>
-              <a:defRPr sz="1100"/>
+            <a:lvl8pPr marL="4620313" indent="0">
+              <a:buNone/>
+              <a:defRPr sz="1300"/>
             </a:lvl8pPr>
-            <a:lvl9pPr marL="4526280" indent="0">
-              <a:buNone/>
-              <a:defRPr sz="1100"/>
+            <a:lvl9pPr marL="5280358" indent="0">
+              <a:buNone/>
+              <a:defRPr sz="1300"/>
             </a:lvl9pPr>
           </a:lstStyle>
           <a:p>
@@ -3130,8 +3130,8 @@
         </p:nvSpPr>
         <p:spPr>
           <a:xfrm>
-            <a:off x="0" y="1"/>
-            <a:ext cx="315040" cy="9001125"/>
+            <a:off x="0" y="2"/>
+            <a:ext cx="360046" cy="10801350"/>
           </a:xfrm>
           <a:prstGeom prst="rect">
             <a:avLst/>
@@ -3182,7 +3182,7 @@
           </a:fontRef>
         </p:style>
         <p:txBody>
-          <a:bodyPr lIns="113157" tIns="56579" rIns="113157" bIns="56579" rtlCol="0" anchor="ctr"/>
+          <a:bodyPr lIns="132009" tIns="66005" rIns="132009" bIns="66005" rtlCol="0" anchor="ctr"/>
           <a:lstStyle/>
           <a:p>
             <a:pPr algn="ctr"/>
@@ -3206,8 +3206,8 @@
         </p:nvSpPr>
         <p:spPr>
           <a:xfrm>
-            <a:off x="0" y="1"/>
-            <a:ext cx="315040" cy="9001125"/>
+            <a:off x="0" y="2"/>
+            <a:ext cx="360046" cy="10801350"/>
           </a:xfrm>
           <a:prstGeom prst="rect">
             <a:avLst/>
@@ -3259,7 +3259,7 @@
           </a:fontRef>
         </p:style>
         <p:txBody>
-          <a:bodyPr lIns="113157" tIns="56579" rIns="113157" bIns="56579" rtlCol="0" anchor="ctr"/>
+          <a:bodyPr lIns="132009" tIns="66005" rIns="132009" bIns="66005" rtlCol="0" anchor="ctr"/>
           <a:lstStyle/>
           <a:p>
             <a:pPr algn="ctr"/>
@@ -3287,15 +3287,15 @@
         </p:nvSpPr>
         <p:spPr>
           <a:xfrm>
-            <a:off x="1680211" y="6900862"/>
-            <a:ext cx="9976247" cy="1500188"/>
+            <a:off x="1920242" y="8281034"/>
+            <a:ext cx="11401425" cy="1800226"/>
           </a:xfrm>
           <a:prstGeom prst="rect">
             <a:avLst/>
           </a:prstGeom>
         </p:spPr>
         <p:txBody>
-          <a:bodyPr vert="horz" lIns="113157" tIns="56579" rIns="113157" bIns="56579" rtlCol="0" anchor="b">
+          <a:bodyPr vert="horz" lIns="132009" tIns="66005" rIns="132009" bIns="66005" rtlCol="0" anchor="b">
             <a:noAutofit/>
           </a:bodyPr>
           <a:lstStyle/>
@@ -3316,15 +3316,15 @@
         </p:nvSpPr>
         <p:spPr>
           <a:xfrm>
-            <a:off x="1680211" y="1100139"/>
-            <a:ext cx="10291287" cy="5800725"/>
+            <a:off x="1920242" y="1320167"/>
+            <a:ext cx="11761471" cy="6960870"/>
           </a:xfrm>
           <a:prstGeom prst="rect">
             <a:avLst/>
           </a:prstGeom>
         </p:spPr>
         <p:txBody>
-          <a:bodyPr vert="horz" lIns="113157" tIns="56579" rIns="113157" bIns="56579" rtlCol="0">
+          <a:bodyPr vert="horz" lIns="132009" tIns="66005" rIns="132009" bIns="66005" rtlCol="0">
             <a:normAutofit/>
           </a:bodyPr>
           <a:lstStyle/>
@@ -3378,18 +3378,18 @@
         </p:nvSpPr>
         <p:spPr>
           <a:xfrm>
-            <a:off x="1735997" y="8601075"/>
-            <a:ext cx="9871234" cy="300038"/>
+            <a:off x="1983997" y="10321290"/>
+            <a:ext cx="11281410" cy="360046"/>
           </a:xfrm>
           <a:prstGeom prst="rect">
             <a:avLst/>
           </a:prstGeom>
         </p:spPr>
         <p:txBody>
-          <a:bodyPr vert="horz" lIns="113157" tIns="56579" rIns="113157" bIns="56579" rtlCol="0" anchor="ctr"/>
+          <a:bodyPr vert="horz" lIns="132009" tIns="66005" rIns="132009" bIns="66005" rtlCol="0" anchor="ctr"/>
           <a:lstStyle>
             <a:lvl1pPr algn="l">
-              <a:defRPr sz="1500">
+              <a:defRPr sz="1700">
                 <a:solidFill>
                   <a:schemeClr val="tx1">
                     <a:lumMod val="60000"/>
@@ -3416,18 +3416,18 @@
         </p:nvSpPr>
         <p:spPr>
           <a:xfrm>
-            <a:off x="11971497" y="7534276"/>
-            <a:ext cx="525065" cy="479227"/>
+            <a:off x="13681712" y="9041132"/>
+            <a:ext cx="600074" cy="575072"/>
           </a:xfrm>
           <a:prstGeom prst="rect">
             <a:avLst/>
           </a:prstGeom>
         </p:spPr>
         <p:txBody>
-          <a:bodyPr vert="horz" lIns="113157" tIns="56579" rIns="113157" bIns="56579" rtlCol="0" anchor="ctr"/>
+          <a:bodyPr vert="horz" lIns="132009" tIns="66005" rIns="132009" bIns="66005" rtlCol="0" anchor="ctr"/>
           <a:lstStyle>
             <a:lvl1pPr algn="l">
-              <a:defRPr sz="1500" b="0">
+              <a:defRPr sz="1700" b="0">
                 <a:solidFill>
                   <a:schemeClr val="tx2">
                     <a:lumMod val="60000"/>
@@ -3457,8 +3457,8 @@
         </p:nvSpPr>
         <p:spPr bwMode="auto">
           <a:xfrm>
-            <a:off x="11649895" y="7500937"/>
-            <a:ext cx="334728" cy="566738"/>
+            <a:off x="13314166" y="9001124"/>
+            <a:ext cx="382546" cy="680086"/>
           </a:xfrm>
           <a:custGeom>
             <a:avLst/>
@@ -3535,7 +3535,7 @@
           </a:ln>
         </p:spPr>
         <p:txBody>
-          <a:bodyPr vert="horz" wrap="square" lIns="113157" tIns="56579" rIns="113157" bIns="56579" numCol="1" anchor="t" anchorCtr="0" compatLnSpc="1">
+          <a:bodyPr vert="horz" wrap="square" lIns="132009" tIns="66005" rIns="132009" bIns="66005" numCol="1" anchor="t" anchorCtr="0" compatLnSpc="1">
             <a:prstTxWarp prst="textNoShape">
               <a:avLst/>
             </a:prstTxWarp>
@@ -3558,18 +3558,18 @@
         </p:nvSpPr>
         <p:spPr>
           <a:xfrm rot="16200000">
-            <a:off x="-1565769" y="6320214"/>
-            <a:ext cx="3446584" cy="315040"/>
+            <a:off x="-1887924" y="7593258"/>
+            <a:ext cx="4135901" cy="360046"/>
           </a:xfrm>
           <a:prstGeom prst="rect">
             <a:avLst/>
           </a:prstGeom>
         </p:spPr>
         <p:txBody>
-          <a:bodyPr vert="horz" lIns="113157" tIns="56579" rIns="113157" bIns="56579" rtlCol="0" anchor="ctr"/>
+          <a:bodyPr vert="horz" lIns="132009" tIns="66005" rIns="132009" bIns="66005" rtlCol="0" anchor="ctr"/>
           <a:lstStyle>
             <a:lvl1pPr algn="l">
-              <a:defRPr sz="1500">
+              <a:defRPr sz="1700">
                 <a:solidFill>
                   <a:srgbClr val="FFFFFF"/>
                 </a:solidFill>
@@ -3738,12 +3738,12 @@
   </p:timing>
   <p:txStyles>
     <p:titleStyle>
-      <a:lvl1pPr algn="l" defTabSz="1131570" rtl="0" eaLnBrk="1" latinLnBrk="0" hangingPunct="1">
+      <a:lvl1pPr algn="l" defTabSz="1320090" rtl="0" eaLnBrk="1" latinLnBrk="0" hangingPunct="1">
         <a:spcBef>
           <a:spcPct val="0"/>
         </a:spcBef>
         <a:buNone/>
-        <a:defRPr sz="8900" b="1" kern="1200">
+        <a:defRPr sz="10400" b="1" kern="1200">
           <a:ln w="12700">
             <a:solidFill>
               <a:schemeClr val="tx2"/>
@@ -3766,13 +3766,13 @@
       </a:lvl1pPr>
     </p:titleStyle>
     <p:bodyStyle>
-      <a:lvl1pPr marL="424339" indent="-424339" algn="l" defTabSz="1131570" rtl="0" eaLnBrk="1" latinLnBrk="0" hangingPunct="1">
+      <a:lvl1pPr marL="495034" indent="-495034" algn="l" defTabSz="1320090" rtl="0" eaLnBrk="1" latinLnBrk="0" hangingPunct="1">
         <a:spcBef>
           <a:spcPct val="20000"/>
         </a:spcBef>
         <a:buFont typeface="Arial" pitchFamily="34" charset="0"/>
         <a:buChar char="»"/>
-        <a:defRPr sz="3500" kern="1200">
+        <a:defRPr sz="4100" kern="1200">
           <a:solidFill>
             <a:schemeClr val="tx2"/>
           </a:solidFill>
@@ -3781,13 +3781,13 @@
           <a:cs typeface="+mn-cs"/>
         </a:defRPr>
       </a:lvl1pPr>
-      <a:lvl2pPr marL="919401" indent="-353616" algn="l" defTabSz="1131570" rtl="0" eaLnBrk="1" latinLnBrk="0" hangingPunct="1">
+      <a:lvl2pPr marL="1072573" indent="-412528" algn="l" defTabSz="1320090" rtl="0" eaLnBrk="1" latinLnBrk="0" hangingPunct="1">
         <a:spcBef>
           <a:spcPct val="20000"/>
         </a:spcBef>
         <a:buFont typeface="Arial" pitchFamily="34" charset="0"/>
         <a:buChar char="˃"/>
-        <a:defRPr sz="2200" kern="1200">
+        <a:defRPr sz="2600" kern="1200">
           <a:solidFill>
             <a:schemeClr val="tx1"/>
           </a:solidFill>
@@ -3796,13 +3796,13 @@
           <a:cs typeface="+mn-cs"/>
         </a:defRPr>
       </a:lvl2pPr>
-      <a:lvl3pPr marL="1414463" indent="-282893" algn="l" defTabSz="1131570" rtl="0" eaLnBrk="1" latinLnBrk="0" hangingPunct="1">
+      <a:lvl3pPr marL="1650113" indent="-330023" algn="l" defTabSz="1320090" rtl="0" eaLnBrk="1" latinLnBrk="0" hangingPunct="1">
         <a:spcBef>
           <a:spcPct val="20000"/>
         </a:spcBef>
         <a:buFont typeface="Calibri" pitchFamily="34" charset="0"/>
         <a:buChar char="+"/>
-        <a:defRPr sz="2200" kern="1200">
+        <a:defRPr sz="2600" kern="1200">
           <a:solidFill>
             <a:schemeClr val="tx1"/>
           </a:solidFill>
@@ -3811,13 +3811,13 @@
           <a:cs typeface="+mn-cs"/>
         </a:defRPr>
       </a:lvl3pPr>
-      <a:lvl4pPr marL="1980248" indent="-282893" algn="l" defTabSz="1131570" rtl="0" eaLnBrk="1" latinLnBrk="0" hangingPunct="1">
+      <a:lvl4pPr marL="2310157" indent="-330023" algn="l" defTabSz="1320090" rtl="0" eaLnBrk="1" latinLnBrk="0" hangingPunct="1">
         <a:spcBef>
           <a:spcPct val="20000"/>
         </a:spcBef>
         <a:buFont typeface="Arial" pitchFamily="34" charset="0"/>
         <a:buChar char="–"/>
-        <a:defRPr sz="2200" kern="1200">
+        <a:defRPr sz="2600" kern="1200">
           <a:solidFill>
             <a:schemeClr val="tx1"/>
           </a:solidFill>
@@ -3826,13 +3826,13 @@
           <a:cs typeface="+mn-cs"/>
         </a:defRPr>
       </a:lvl4pPr>
-      <a:lvl5pPr marL="2546033" indent="-282893" algn="l" defTabSz="1131570" rtl="0" eaLnBrk="1" latinLnBrk="0" hangingPunct="1">
+      <a:lvl5pPr marL="2970202" indent="-330023" algn="l" defTabSz="1320090" rtl="0" eaLnBrk="1" latinLnBrk="0" hangingPunct="1">
         <a:spcBef>
           <a:spcPct val="20000"/>
         </a:spcBef>
         <a:buFont typeface="Arial" pitchFamily="34" charset="0"/>
         <a:buChar char="»"/>
-        <a:defRPr sz="2200" kern="1200">
+        <a:defRPr sz="2600" kern="1200">
           <a:solidFill>
             <a:schemeClr val="tx1"/>
           </a:solidFill>
@@ -3841,7 +3841,7 @@
           <a:cs typeface="+mn-cs"/>
         </a:defRPr>
       </a:lvl5pPr>
-      <a:lvl6pPr marL="3111818" indent="-282893" algn="l" defTabSz="1131570" rtl="0" eaLnBrk="1" latinLnBrk="0" hangingPunct="1">
+      <a:lvl6pPr marL="3630247" indent="-330023" algn="l" defTabSz="1320090" rtl="0" eaLnBrk="1" latinLnBrk="0" hangingPunct="1">
         <a:spcBef>
           <a:spcPct val="20000"/>
         </a:spcBef>
@@ -3850,7 +3850,7 @@
         </a:buClr>
         <a:buFont typeface="Calibri" pitchFamily="34" charset="0"/>
         <a:buChar char="&gt;"/>
-        <a:defRPr sz="2200" kern="1200">
+        <a:defRPr sz="2600" kern="1200">
           <a:solidFill>
             <a:schemeClr val="tx1"/>
           </a:solidFill>
@@ -3859,13 +3859,13 @@
           <a:cs typeface="+mn-cs"/>
         </a:defRPr>
       </a:lvl6pPr>
-      <a:lvl7pPr marL="3677603" indent="-282893" algn="l" defTabSz="1131570" rtl="0" eaLnBrk="1" latinLnBrk="0" hangingPunct="1">
+      <a:lvl7pPr marL="4290292" indent="-330023" algn="l" defTabSz="1320090" rtl="0" eaLnBrk="1" latinLnBrk="0" hangingPunct="1">
         <a:spcBef>
           <a:spcPct val="20000"/>
         </a:spcBef>
         <a:buFont typeface="Calibri" pitchFamily="34" charset="0"/>
         <a:buChar char="+"/>
-        <a:defRPr sz="2200" kern="1200">
+        <a:defRPr sz="2600" kern="1200">
           <a:solidFill>
             <a:schemeClr val="tx1"/>
           </a:solidFill>
@@ -3874,7 +3874,7 @@
           <a:cs typeface="+mn-cs"/>
         </a:defRPr>
       </a:lvl7pPr>
-      <a:lvl8pPr marL="4243388" indent="-282893" algn="l" defTabSz="1131570" rtl="0" eaLnBrk="1" latinLnBrk="0" hangingPunct="1">
+      <a:lvl8pPr marL="4950336" indent="-330023" algn="l" defTabSz="1320090" rtl="0" eaLnBrk="1" latinLnBrk="0" hangingPunct="1">
         <a:spcBef>
           <a:spcPct val="20000"/>
         </a:spcBef>
@@ -3883,7 +3883,7 @@
         </a:buClr>
         <a:buFont typeface="Calibri" pitchFamily="34" charset="0"/>
         <a:buChar char="»"/>
-        <a:defRPr sz="2200" kern="1200">
+        <a:defRPr sz="2600" kern="1200">
           <a:solidFill>
             <a:schemeClr val="tx1"/>
           </a:solidFill>
@@ -3892,7 +3892,7 @@
           <a:cs typeface="+mn-cs"/>
         </a:defRPr>
       </a:lvl8pPr>
-      <a:lvl9pPr marL="4809173" indent="-282893" algn="l" defTabSz="1131570" rtl="0" eaLnBrk="1" latinLnBrk="0" hangingPunct="1">
+      <a:lvl9pPr marL="5610381" indent="-330023" algn="l" defTabSz="1320090" rtl="0" eaLnBrk="1" latinLnBrk="0" hangingPunct="1">
         <a:spcBef>
           <a:spcPct val="20000"/>
         </a:spcBef>
@@ -3901,7 +3901,7 @@
         </a:buClr>
         <a:buFont typeface="Calibri" pitchFamily="34" charset="0"/>
         <a:buChar char="−"/>
-        <a:defRPr sz="2200" kern="1200">
+        <a:defRPr sz="2600" kern="1200">
           <a:solidFill>
             <a:schemeClr val="tx1"/>
           </a:solidFill>
@@ -3915,8 +3915,8 @@
       <a:defPPr>
         <a:defRPr lang="en-US"/>
       </a:defPPr>
-      <a:lvl1pPr marL="0" algn="l" defTabSz="1131570" rtl="0" eaLnBrk="1" latinLnBrk="0" hangingPunct="1">
-        <a:defRPr sz="2200" kern="1200">
+      <a:lvl1pPr marL="0" algn="l" defTabSz="1320090" rtl="0" eaLnBrk="1" latinLnBrk="0" hangingPunct="1">
+        <a:defRPr sz="2600" kern="1200">
           <a:solidFill>
             <a:schemeClr val="tx1"/>
           </a:solidFill>
@@ -3925,8 +3925,8 @@
           <a:cs typeface="+mn-cs"/>
         </a:defRPr>
       </a:lvl1pPr>
-      <a:lvl2pPr marL="565785" algn="l" defTabSz="1131570" rtl="0" eaLnBrk="1" latinLnBrk="0" hangingPunct="1">
-        <a:defRPr sz="2200" kern="1200">
+      <a:lvl2pPr marL="660045" algn="l" defTabSz="1320090" rtl="0" eaLnBrk="1" latinLnBrk="0" hangingPunct="1">
+        <a:defRPr sz="2600" kern="1200">
           <a:solidFill>
             <a:schemeClr val="tx1"/>
           </a:solidFill>
@@ -3935,8 +3935,8 @@
           <a:cs typeface="+mn-cs"/>
         </a:defRPr>
       </a:lvl2pPr>
-      <a:lvl3pPr marL="1131570" algn="l" defTabSz="1131570" rtl="0" eaLnBrk="1" latinLnBrk="0" hangingPunct="1">
-        <a:defRPr sz="2200" kern="1200">
+      <a:lvl3pPr marL="1320090" algn="l" defTabSz="1320090" rtl="0" eaLnBrk="1" latinLnBrk="0" hangingPunct="1">
+        <a:defRPr sz="2600" kern="1200">
           <a:solidFill>
             <a:schemeClr val="tx1"/>
           </a:solidFill>
@@ -3945,8 +3945,8 @@
           <a:cs typeface="+mn-cs"/>
         </a:defRPr>
       </a:lvl3pPr>
-      <a:lvl4pPr marL="1697355" algn="l" defTabSz="1131570" rtl="0" eaLnBrk="1" latinLnBrk="0" hangingPunct="1">
-        <a:defRPr sz="2200" kern="1200">
+      <a:lvl4pPr marL="1980134" algn="l" defTabSz="1320090" rtl="0" eaLnBrk="1" latinLnBrk="0" hangingPunct="1">
+        <a:defRPr sz="2600" kern="1200">
           <a:solidFill>
             <a:schemeClr val="tx1"/>
           </a:solidFill>
@@ -3955,8 +3955,8 @@
           <a:cs typeface="+mn-cs"/>
         </a:defRPr>
       </a:lvl4pPr>
-      <a:lvl5pPr marL="2263140" algn="l" defTabSz="1131570" rtl="0" eaLnBrk="1" latinLnBrk="0" hangingPunct="1">
-        <a:defRPr sz="2200" kern="1200">
+      <a:lvl5pPr marL="2640179" algn="l" defTabSz="1320090" rtl="0" eaLnBrk="1" latinLnBrk="0" hangingPunct="1">
+        <a:defRPr sz="2600" kern="1200">
           <a:solidFill>
             <a:schemeClr val="tx1"/>
           </a:solidFill>
@@ -3965,8 +3965,8 @@
           <a:cs typeface="+mn-cs"/>
         </a:defRPr>
       </a:lvl5pPr>
-      <a:lvl6pPr marL="2828925" algn="l" defTabSz="1131570" rtl="0" eaLnBrk="1" latinLnBrk="0" hangingPunct="1">
-        <a:defRPr sz="2200" kern="1200">
+      <a:lvl6pPr marL="3300224" algn="l" defTabSz="1320090" rtl="0" eaLnBrk="1" latinLnBrk="0" hangingPunct="1">
+        <a:defRPr sz="2600" kern="1200">
           <a:solidFill>
             <a:schemeClr val="tx1"/>
           </a:solidFill>
@@ -3975,8 +3975,8 @@
           <a:cs typeface="+mn-cs"/>
         </a:defRPr>
       </a:lvl6pPr>
-      <a:lvl7pPr marL="3394710" algn="l" defTabSz="1131570" rtl="0" eaLnBrk="1" latinLnBrk="0" hangingPunct="1">
-        <a:defRPr sz="2200" kern="1200">
+      <a:lvl7pPr marL="3960269" algn="l" defTabSz="1320090" rtl="0" eaLnBrk="1" latinLnBrk="0" hangingPunct="1">
+        <a:defRPr sz="2600" kern="1200">
           <a:solidFill>
             <a:schemeClr val="tx1"/>
           </a:solidFill>
@@ -3985,8 +3985,8 @@
           <a:cs typeface="+mn-cs"/>
         </a:defRPr>
       </a:lvl7pPr>
-      <a:lvl8pPr marL="3960495" algn="l" defTabSz="1131570" rtl="0" eaLnBrk="1" latinLnBrk="0" hangingPunct="1">
-        <a:defRPr sz="2200" kern="1200">
+      <a:lvl8pPr marL="4620313" algn="l" defTabSz="1320090" rtl="0" eaLnBrk="1" latinLnBrk="0" hangingPunct="1">
+        <a:defRPr sz="2600" kern="1200">
           <a:solidFill>
             <a:schemeClr val="tx1"/>
           </a:solidFill>
@@ -3995,8 +3995,8 @@
           <a:cs typeface="+mn-cs"/>
         </a:defRPr>
       </a:lvl8pPr>
-      <a:lvl9pPr marL="4526280" algn="l" defTabSz="1131570" rtl="0" eaLnBrk="1" latinLnBrk="0" hangingPunct="1">
-        <a:defRPr sz="2200" kern="1200">
+      <a:lvl9pPr marL="5280358" algn="l" defTabSz="1320090" rtl="0" eaLnBrk="1" latinLnBrk="0" hangingPunct="1">
+        <a:defRPr sz="2600" kern="1200">
           <a:solidFill>
             <a:schemeClr val="tx1"/>
           </a:solidFill>
@@ -4039,8 +4039,8 @@
         </p:nvSpPr>
         <p:spPr>
           <a:xfrm>
-            <a:off x="4515469" y="1188194"/>
-            <a:ext cx="3744416" cy="504056"/>
+            <a:off x="5160536" y="1425833"/>
+            <a:ext cx="4279333" cy="777686"/>
           </a:xfrm>
           <a:prstGeom prst="snip2SameRect">
             <a:avLst/>
@@ -4062,7 +4062,7 @@
         </p:style>
         <p:txBody>
           <a:bodyPr>
-            <a:normAutofit lnSpcReduction="10000"/>
+            <a:normAutofit fontScale="92500" lnSpcReduction="20000"/>
           </a:bodyPr>
           <a:lstStyle/>
           <a:p>
@@ -4070,11 +4070,24 @@
               <a:buNone/>
             </a:pPr>
             <a:r>
-              <a:rPr lang="nl-NL" sz="1100" b="1" dirty="0" smtClean="0"/>
-              <a:t>Tomas Heinsohn Huala</a:t>
-            </a:r>
-            <a:r>
-              <a:rPr lang="nl-NL" sz="1100" dirty="0" smtClean="0"/>
+              <a:rPr lang="nl-NL" sz="1500" b="1" dirty="0" smtClean="0"/>
+              <a:t>Group 9:</a:t>
+            </a:r>
+          </a:p>
+          <a:p>
+            <a:pPr marL="0" indent="0" algn="ctr">
+              <a:buNone/>
+            </a:pPr>
+            <a:r>
+              <a:rPr lang="nl-NL" sz="1300" b="1" dirty="0" smtClean="0"/>
+              <a:t>Tomas </a:t>
+            </a:r>
+            <a:r>
+              <a:rPr lang="nl-NL" sz="1300" b="1" dirty="0"/>
+              <a:t>Heinsohn Huala</a:t>
+            </a:r>
+            <a:r>
+              <a:rPr lang="nl-NL" sz="1300" dirty="0"/>
               <a:t>	4326318</a:t>
             </a:r>
           </a:p>
@@ -4083,14 +4096,14 @@
               <a:buNone/>
             </a:pPr>
             <a:r>
-              <a:rPr lang="nl-NL" sz="1100" b="1" dirty="0" smtClean="0"/>
+              <a:rPr lang="nl-NL" sz="1300" b="1" dirty="0"/>
               <a:t>Remi van der Laan	</a:t>
             </a:r>
             <a:r>
-              <a:rPr lang="nl-NL" sz="1100" dirty="0" smtClean="0"/>
+              <a:rPr lang="nl-NL" sz="1300" dirty="0"/>
               <a:t>	4326156</a:t>
             </a:r>
-            <a:endParaRPr lang="nl-NL" sz="1100" dirty="0"/>
+            <a:endParaRPr lang="nl-NL" sz="1300" dirty="0"/>
           </a:p>
         </p:txBody>
       </p:sp>
@@ -4106,8 +4119,8 @@
         </p:nvSpPr>
         <p:spPr>
           <a:xfrm>
-            <a:off x="2662832" y="252090"/>
-            <a:ext cx="7449690" cy="936104"/>
+            <a:off x="3043237" y="302508"/>
+            <a:ext cx="8513931" cy="1123325"/>
           </a:xfrm>
           <a:prstGeom prst="snip2DiagRect">
             <a:avLst/>
@@ -4133,7 +4146,7 @@
           <a:p>
             <a:pPr algn="ctr"/>
             <a:r>
-              <a:rPr lang="nl-NL" sz="4800" dirty="0" err="1" smtClean="0">
+              <a:rPr lang="en-US" sz="5600" dirty="0" smtClean="0">
                 <a:ln w="12700">
                   <a:solidFill>
                     <a:schemeClr val="tx2">
@@ -4158,121 +4171,9 @@
                 <a:latin typeface="Baskerville Old Face" panose="02020602080505020303" pitchFamily="18" charset="0"/>
                 <a:cs typeface="Times New Roman" panose="02020603050405020304" pitchFamily="18" charset="0"/>
               </a:rPr>
-              <a:t>Licence</a:t>
-            </a:r>
-            <a:r>
-              <a:rPr lang="nl-NL" sz="4800" dirty="0" smtClean="0">
-                <a:ln w="12700">
-                  <a:solidFill>
-                    <a:schemeClr val="tx2">
-                      <a:satMod val="155000"/>
-                    </a:schemeClr>
-                  </a:solidFill>
-                  <a:prstDash val="solid"/>
-                </a:ln>
-                <a:solidFill>
-                  <a:schemeClr val="bg2">
-                    <a:tint val="85000"/>
-                    <a:satMod val="155000"/>
-                  </a:schemeClr>
-                </a:solidFill>
-                <a:effectLst>
-                  <a:outerShdw blurRad="41275" dist="20320" dir="1800000" algn="tl" rotWithShape="0">
-                    <a:srgbClr val="000000">
-                      <a:alpha val="40000"/>
-                    </a:srgbClr>
-                  </a:outerShdw>
-                </a:effectLst>
-                <a:latin typeface="Baskerville Old Face" panose="02020602080505020303" pitchFamily="18" charset="0"/>
-                <a:cs typeface="Times New Roman" panose="02020603050405020304" pitchFamily="18" charset="0"/>
-              </a:rPr>
-              <a:t> </a:t>
-            </a:r>
-            <a:r>
-              <a:rPr lang="nl-NL" sz="4800" dirty="0" err="1" smtClean="0">
-                <a:ln w="12700">
-                  <a:solidFill>
-                    <a:schemeClr val="tx2">
-                      <a:satMod val="155000"/>
-                    </a:schemeClr>
-                  </a:solidFill>
-                  <a:prstDash val="solid"/>
-                </a:ln>
-                <a:solidFill>
-                  <a:schemeClr val="bg2">
-                    <a:tint val="85000"/>
-                    <a:satMod val="155000"/>
-                  </a:schemeClr>
-                </a:solidFill>
-                <a:effectLst>
-                  <a:outerShdw blurRad="41275" dist="20320" dir="1800000" algn="tl" rotWithShape="0">
-                    <a:srgbClr val="000000">
-                      <a:alpha val="40000"/>
-                    </a:srgbClr>
-                  </a:outerShdw>
-                </a:effectLst>
-                <a:latin typeface="Baskerville Old Face" panose="02020602080505020303" pitchFamily="18" charset="0"/>
-                <a:cs typeface="Times New Roman" panose="02020603050405020304" pitchFamily="18" charset="0"/>
-              </a:rPr>
-              <a:t>Plate</a:t>
-            </a:r>
-            <a:r>
-              <a:rPr lang="nl-NL" sz="4800" dirty="0" smtClean="0">
-                <a:ln w="12700">
-                  <a:solidFill>
-                    <a:schemeClr val="tx2">
-                      <a:satMod val="155000"/>
-                    </a:schemeClr>
-                  </a:solidFill>
-                  <a:prstDash val="solid"/>
-                </a:ln>
-                <a:solidFill>
-                  <a:schemeClr val="bg2">
-                    <a:tint val="85000"/>
-                    <a:satMod val="155000"/>
-                  </a:schemeClr>
-                </a:solidFill>
-                <a:effectLst>
-                  <a:outerShdw blurRad="41275" dist="20320" dir="1800000" algn="tl" rotWithShape="0">
-                    <a:srgbClr val="000000">
-                      <a:alpha val="40000"/>
-                    </a:srgbClr>
-                  </a:outerShdw>
-                </a:effectLst>
-                <a:latin typeface="Baskerville Old Face" panose="02020602080505020303" pitchFamily="18" charset="0"/>
-                <a:cs typeface="Times New Roman" panose="02020603050405020304" pitchFamily="18" charset="0"/>
-              </a:rPr>
-              <a:t> </a:t>
-            </a:r>
-            <a:r>
-              <a:rPr lang="nl-NL" sz="4800" dirty="0" err="1" smtClean="0">
-                <a:ln w="12700">
-                  <a:solidFill>
-                    <a:schemeClr val="tx2">
-                      <a:satMod val="155000"/>
-                    </a:schemeClr>
-                  </a:solidFill>
-                  <a:prstDash val="solid"/>
-                </a:ln>
-                <a:solidFill>
-                  <a:schemeClr val="bg2">
-                    <a:tint val="85000"/>
-                    <a:satMod val="155000"/>
-                  </a:schemeClr>
-                </a:solidFill>
-                <a:effectLst>
-                  <a:outerShdw blurRad="41275" dist="20320" dir="1800000" algn="tl" rotWithShape="0">
-                    <a:srgbClr val="000000">
-                      <a:alpha val="40000"/>
-                    </a:srgbClr>
-                  </a:outerShdw>
-                </a:effectLst>
-                <a:latin typeface="Baskerville Old Face" panose="02020602080505020303" pitchFamily="18" charset="0"/>
-                <a:cs typeface="Times New Roman" panose="02020603050405020304" pitchFamily="18" charset="0"/>
-              </a:rPr>
-              <a:t>Recognition</a:t>
-            </a:r>
-            <a:endParaRPr lang="nl-NL" sz="4800" dirty="0">
+              <a:t>License Plate Recognition</a:t>
+            </a:r>
+            <a:endParaRPr lang="en-US" sz="5600" dirty="0">
               <a:ln w="12700">
                 <a:solidFill>
                   <a:schemeClr val="tx2">
@@ -4312,8 +4213,8 @@
         </p:nvSpPr>
         <p:spPr>
           <a:xfrm>
-            <a:off x="540148" y="1260202"/>
-            <a:ext cx="3744416" cy="648072"/>
+            <a:off x="635667" y="1584251"/>
+            <a:ext cx="4279333" cy="777686"/>
           </a:xfrm>
         </p:spPr>
         <p:txBody>
@@ -4326,7 +4227,7 @@
               <a:buNone/>
             </a:pPr>
             <a:r>
-              <a:rPr lang="nl-NL" sz="3200" smtClean="0">
+              <a:rPr lang="en-US" sz="3700" dirty="0" smtClean="0">
                 <a:ln w="10160">
                   <a:solidFill>
                     <a:schemeClr val="accent1"/>
@@ -4346,7 +4247,12 @@
               </a:rPr>
               <a:t>Introduction</a:t>
             </a:r>
-            <a:endParaRPr lang="nl-NL" sz="3200" dirty="0" smtClean="0">
+          </a:p>
+          <a:p>
+            <a:pPr marL="0" indent="0">
+              <a:buNone/>
+            </a:pPr>
+            <a:endParaRPr lang="nl-NL" sz="3700" dirty="0">
               <a:ln w="10160">
                 <a:solidFill>
                   <a:schemeClr val="accent1"/>
@@ -4365,29 +4271,6 @@
               </a:effectLst>
             </a:endParaRPr>
           </a:p>
-          <a:p>
-            <a:pPr marL="0" indent="0">
-              <a:buNone/>
-            </a:pPr>
-            <a:endParaRPr lang="nl-NL" sz="3200" dirty="0">
-              <a:ln w="10160">
-                <a:solidFill>
-                  <a:schemeClr val="accent1"/>
-                </a:solidFill>
-                <a:prstDash val="solid"/>
-              </a:ln>
-              <a:solidFill>
-                <a:srgbClr val="FFFFFF"/>
-              </a:solidFill>
-              <a:effectLst>
-                <a:outerShdw blurRad="38100" dist="32000" dir="5400000" algn="tl">
-                  <a:srgbClr val="000000">
-                    <a:alpha val="30000"/>
-                  </a:srgbClr>
-                </a:outerShdw>
-              </a:effectLst>
-            </a:endParaRPr>
-          </a:p>
         </p:txBody>
       </p:sp>
       <p:sp>
@@ -4402,8 +4285,8 @@
         </p:nvSpPr>
         <p:spPr>
           <a:xfrm>
-            <a:off x="540147" y="1836266"/>
-            <a:ext cx="3744416" cy="3456384"/>
+            <a:off x="617311" y="2203520"/>
+            <a:ext cx="4279333" cy="3125147"/>
           </a:xfrm>
           <a:ln/>
         </p:spPr>
@@ -4431,84 +4314,78 @@
               <a:buNone/>
             </a:pPr>
             <a:r>
+              <a:rPr lang="en-US" sz="1100" dirty="0"/>
+              <a:t>All those car drivers with their unregistered cars and all those uninsured </a:t>
+            </a:r>
+            <a:r>
               <a:rPr lang="en-US" sz="1100" dirty="0" smtClean="0"/>
-              <a:t>All those car drivers with their unregistered cars and all those uninsured cars. It should be stopped! We have the possibility to stop it and  help the government. The solution is license plate recognition.  Based on images we have the possibility to recognize license plates and to write those numbers down.</a:t>
+              <a:t>cars, it </a:t>
+            </a:r>
+            <a:r>
+              <a:rPr lang="en-US" sz="1100" dirty="0"/>
+              <a:t>should be stopped! </a:t>
+            </a:r>
+            <a:r>
+              <a:rPr lang="en-US" sz="1100" dirty="0"/>
+              <a:t>We have the possibility to stop it and  help the government. The solution is license plate recognition.  Based on images we have the possibility to recognize license plates and to write those numbers down.</a:t>
             </a:r>
           </a:p>
           <a:p>
             <a:pPr marL="0" indent="0">
               <a:buNone/>
             </a:pPr>
-            <a:endParaRPr lang="en-US" sz="1100" dirty="0" smtClean="0"/>
+            <a:endParaRPr lang="en-US" sz="1100" dirty="0"/>
           </a:p>
           <a:p>
             <a:pPr marL="0" indent="0">
               <a:buNone/>
             </a:pPr>
-            <a:endParaRPr lang="en-US" sz="1100" dirty="0" smtClean="0"/>
+            <a:endParaRPr lang="en-US" sz="1100" dirty="0"/>
           </a:p>
           <a:p>
             <a:pPr marL="0" indent="0">
               <a:buNone/>
             </a:pPr>
-            <a:endParaRPr lang="en-US" sz="1100" dirty="0" smtClean="0"/>
+            <a:endParaRPr lang="en-US" sz="1100" dirty="0"/>
           </a:p>
           <a:p>
             <a:pPr marL="0" indent="0">
               <a:buNone/>
             </a:pPr>
-            <a:endParaRPr lang="en-US" sz="1100" dirty="0" smtClean="0"/>
+            <a:r>
+              <a:rPr lang="en-US" sz="1100" dirty="0"/>
+              <a:t>This is how a typically Dutch license plate looks like.  Most of the time it is a yellow  plate, but this is not always the case. There are also different kind of plates and there are also foreign license plates. Another problem is that those license plates will not always be that visible. This is an example of an different license plate.</a:t>
+            </a:r>
           </a:p>
           <a:p>
             <a:pPr marL="0" indent="0">
               <a:buNone/>
             </a:pPr>
-            <a:r>
-              <a:rPr lang="en-US" sz="1100" dirty="0" smtClean="0"/>
-              <a:t>This is how a typically Dutch license plate looks like.  Most of the time it is a yellow  plate, but this is not always the case. There are also different kind of plates and there are also foreign license plates. Another problem is that those license plates will not always be </a:t>
-            </a:r>
-            <a:r>
-              <a:rPr lang="en-US" sz="1100" dirty="0" smtClean="0"/>
-              <a:t>that</a:t>
-            </a:r>
-            <a:r>
-              <a:rPr lang="en-US" sz="1100" dirty="0" smtClean="0"/>
+            <a:endParaRPr lang="en-US" sz="1100" dirty="0"/>
+          </a:p>
+          <a:p>
+            <a:pPr marL="0" indent="0">
+              <a:buNone/>
+            </a:pPr>
+            <a:r>
+              <a:rPr lang="en-US" sz="1100" dirty="0"/>
               <a:t> </a:t>
             </a:r>
-            <a:r>
-              <a:rPr lang="en-US" sz="1100" dirty="0" smtClean="0"/>
-              <a:t>visible. This is an example of an different license plate.</a:t>
-            </a:r>
           </a:p>
           <a:p>
             <a:pPr marL="0" indent="0">
               <a:buNone/>
             </a:pPr>
-            <a:endParaRPr lang="en-US" sz="1100" dirty="0" smtClean="0"/>
+            <a:r>
+              <a:rPr lang="en-US" sz="1100" dirty="0"/>
+              <a:t> </a:t>
+            </a:r>
           </a:p>
           <a:p>
             <a:pPr marL="0" indent="0">
               <a:buNone/>
             </a:pPr>
-            <a:r>
-              <a:rPr lang="en-US" sz="1100" dirty="0" smtClean="0"/>
-              <a:t> </a:t>
-            </a:r>
-          </a:p>
-          <a:p>
-            <a:pPr marL="0" indent="0">
-              <a:buNone/>
-            </a:pPr>
-            <a:r>
-              <a:rPr lang="en-US" sz="1100" dirty="0" smtClean="0"/>
-              <a:t> </a:t>
-            </a:r>
-          </a:p>
-          <a:p>
-            <a:pPr marL="0" indent="0">
-              <a:buNone/>
-            </a:pPr>
-            <a:endParaRPr lang="en-US" sz="1100" dirty="0" smtClean="0"/>
+            <a:endParaRPr lang="en-US" sz="1100" dirty="0"/>
           </a:p>
           <a:p>
             <a:pPr marL="0" indent="0">
@@ -4530,8 +4407,8 @@
         </p:nvSpPr>
         <p:spPr>
           <a:xfrm>
-            <a:off x="4507085" y="2412330"/>
-            <a:ext cx="3744416" cy="6048672"/>
+            <a:off x="5142900" y="2820015"/>
+            <a:ext cx="4279333" cy="7848129"/>
           </a:xfrm>
           <a:ln/>
         </p:spPr>
@@ -4560,41 +4437,124 @@
             </a:pPr>
             <a:r>
               <a:rPr lang="en-US" sz="1100" dirty="0" smtClean="0"/>
-              <a:t>We made the GUI with the tool guide. Below here we show you our GUI. It’s not the right GUI yet but we made it like this so we can easily see what happens if we are using it.</a:t>
+              <a:t>The </a:t>
+            </a:r>
+            <a:r>
+              <a:rPr lang="en-US" sz="1100" dirty="0"/>
+              <a:t>first step of recognizing the license plates is to remove the background of the image. We do this by creating graphs of the colors of license plates and looking where they are present in the red, green and blue channels. For every pair of two colors we created these graphs, here is the one for Green versus Red:</a:t>
             </a:r>
           </a:p>
           <a:p>
             <a:pPr marL="0" indent="0">
               <a:buNone/>
             </a:pPr>
+            <a:endParaRPr lang="en-US" sz="1100" dirty="0"/>
+          </a:p>
+          <a:p>
+            <a:pPr marL="0" indent="0">
+              <a:buNone/>
+            </a:pPr>
+            <a:endParaRPr lang="en-US" sz="1100" dirty="0"/>
+          </a:p>
+          <a:p>
+            <a:pPr marL="0" indent="0">
+              <a:buNone/>
+            </a:pPr>
+            <a:endParaRPr lang="en-US" sz="1100" dirty="0"/>
+          </a:p>
+          <a:p>
+            <a:pPr marL="0" indent="0">
+              <a:buNone/>
+            </a:pPr>
+            <a:endParaRPr lang="en-US" sz="1100" dirty="0"/>
+          </a:p>
+          <a:p>
+            <a:pPr marL="0" indent="0">
+              <a:buNone/>
+            </a:pPr>
+            <a:endParaRPr lang="en-US" sz="1100" dirty="0"/>
+          </a:p>
+          <a:p>
+            <a:pPr marL="0" indent="0">
+              <a:buNone/>
+            </a:pPr>
+            <a:endParaRPr lang="en-US" sz="1100" dirty="0"/>
+          </a:p>
+          <a:p>
+            <a:pPr marL="0" indent="0">
+              <a:buNone/>
+            </a:pPr>
+            <a:endParaRPr lang="en-US" sz="1100" dirty="0"/>
+          </a:p>
+          <a:p>
+            <a:pPr marL="0" indent="0">
+              <a:buNone/>
+            </a:pPr>
+            <a:endParaRPr lang="en-US" sz="1100" dirty="0"/>
+          </a:p>
+          <a:p>
+            <a:pPr marL="0" indent="0">
+              <a:buNone/>
+            </a:pPr>
+            <a:endParaRPr lang="en-US" sz="1100" dirty="0"/>
+          </a:p>
+          <a:p>
+            <a:pPr marL="0" indent="0">
+              <a:buNone/>
+            </a:pPr>
+            <a:endParaRPr lang="en-US" sz="1100" dirty="0"/>
+          </a:p>
+          <a:p>
+            <a:pPr marL="0" indent="0">
+              <a:buNone/>
+            </a:pPr>
+            <a:endParaRPr lang="en-US" sz="1100" dirty="0"/>
+          </a:p>
+          <a:p>
+            <a:pPr marL="0" indent="0">
+              <a:buNone/>
+            </a:pPr>
             <a:endParaRPr lang="en-US" sz="1100" dirty="0" smtClean="0"/>
           </a:p>
           <a:p>
             <a:pPr marL="0" indent="0">
-              <a:buFontTx/>
-              <a:buChar char="-"/>
-            </a:pPr>
-            <a:r>
-              <a:rPr lang="en-US" sz="1100" dirty="0" err="1" smtClean="0"/>
-              <a:t>Hier</a:t>
-            </a:r>
+              <a:buNone/>
+            </a:pPr>
+            <a:endParaRPr lang="en-US" sz="1100" dirty="0"/>
+          </a:p>
+          <a:p>
+            <a:pPr marL="0" indent="0">
+              <a:buNone/>
+            </a:pPr>
+            <a:endParaRPr lang="en-US" sz="1100" dirty="0"/>
+          </a:p>
+          <a:p>
+            <a:pPr marL="0" indent="0">
+              <a:buNone/>
+            </a:pPr>
+            <a:endParaRPr lang="en-US" sz="1100" dirty="0"/>
+          </a:p>
+          <a:p>
+            <a:pPr marL="0" indent="0">
+              <a:buNone/>
+            </a:pPr>
             <a:r>
               <a:rPr lang="en-US" sz="1100" dirty="0" smtClean="0"/>
-              <a:t> </a:t>
-            </a:r>
-            <a:r>
-              <a:rPr lang="en-US" sz="1100" dirty="0" err="1" smtClean="0"/>
-              <a:t>een</a:t>
+              <a:t>Here </a:t>
+            </a:r>
+            <a:r>
+              <a:rPr lang="en-US" sz="1100" dirty="0"/>
+              <a:t>you can see that the red and green colors are between two lines. </a:t>
             </a:r>
             <a:r>
               <a:rPr lang="en-US" sz="1100" dirty="0" smtClean="0"/>
-              <a:t> screenshot van de GUI </a:t>
-            </a:r>
+              <a:t>By looking at each of the graphs and checking where the colors were present, we were able to remove the background almost completely, like in this image:</a:t>
+            </a:r>
+            <a:endParaRPr lang="en-US" sz="1100" dirty="0"/>
           </a:p>
           <a:p>
             <a:pPr marL="0" indent="0">
-              <a:buFontTx/>
-              <a:buChar char="-"/>
+              <a:buNone/>
             </a:pPr>
             <a:endParaRPr lang="en-US" sz="1100" dirty="0" smtClean="0"/>
           </a:p>
@@ -4602,79 +4562,85 @@
             <a:pPr marL="0" indent="0">
               <a:buNone/>
             </a:pPr>
+            <a:endParaRPr lang="en-US" sz="1100" dirty="0"/>
+          </a:p>
+          <a:p>
+            <a:pPr marL="0" indent="0">
+              <a:buNone/>
+            </a:pPr>
+            <a:endParaRPr lang="en-US" sz="1100" dirty="0" smtClean="0"/>
+          </a:p>
+          <a:p>
+            <a:pPr marL="0" indent="0">
+              <a:buNone/>
+            </a:pPr>
+            <a:endParaRPr lang="en-US" sz="1100" dirty="0"/>
+          </a:p>
+          <a:p>
+            <a:pPr marL="0" indent="0">
+              <a:buNone/>
+            </a:pPr>
+            <a:endParaRPr lang="en-US" sz="1100" dirty="0" smtClean="0"/>
+          </a:p>
+          <a:p>
+            <a:pPr marL="0" indent="0">
+              <a:buNone/>
+            </a:pPr>
+            <a:endParaRPr lang="en-US" sz="1100" dirty="0"/>
+          </a:p>
+          <a:p>
+            <a:pPr marL="0" indent="0">
+              <a:buNone/>
+            </a:pPr>
+            <a:endParaRPr lang="en-US" sz="1100" dirty="0" smtClean="0"/>
+          </a:p>
+          <a:p>
+            <a:pPr marL="0" indent="0">
+              <a:buNone/>
+            </a:pPr>
+            <a:endParaRPr lang="en-US" sz="1100" dirty="0"/>
+          </a:p>
+          <a:p>
+            <a:pPr marL="0" indent="0">
+              <a:buNone/>
+            </a:pPr>
+            <a:endParaRPr lang="en-US" sz="1100" dirty="0"/>
+          </a:p>
+          <a:p>
+            <a:pPr marL="0" indent="0">
+              <a:buNone/>
+            </a:pPr>
+            <a:endParaRPr lang="en-US" sz="1100" dirty="0" smtClean="0"/>
+          </a:p>
+          <a:p>
+            <a:pPr marL="0" indent="0">
+              <a:buNone/>
+            </a:pPr>
+            <a:endParaRPr lang="en-US" sz="1100" dirty="0"/>
+          </a:p>
+          <a:p>
+            <a:pPr marL="0" indent="0">
+              <a:buNone/>
+            </a:pPr>
+            <a:endParaRPr lang="en-US" sz="1100" dirty="0" smtClean="0"/>
+          </a:p>
+          <a:p>
+            <a:pPr marL="0" indent="0">
+              <a:buNone/>
+            </a:pPr>
             <a:r>
               <a:rPr lang="en-US" sz="1100" dirty="0" smtClean="0"/>
-              <a:t>This GUI contains several different components:</a:t>
-            </a:r>
-          </a:p>
-          <a:p>
-            <a:pPr marL="228600" indent="-228600">
-              <a:buFont typeface="+mj-lt"/>
-              <a:buAutoNum type="arabicPeriod"/>
-            </a:pPr>
+              <a:t>As </a:t>
+            </a:r>
+            <a:r>
+              <a:rPr lang="en-US" sz="1100" dirty="0"/>
+              <a:t>you can see, the result is not perfect, but we hope improve this by tweaking </a:t>
+            </a:r>
             <a:r>
               <a:rPr lang="en-US" sz="1100" dirty="0" smtClean="0"/>
-              <a:t>Able to load video to detect</a:t>
-            </a:r>
-          </a:p>
-          <a:p>
-            <a:pPr marL="228600" indent="-228600">
-              <a:buFont typeface="+mj-lt"/>
-              <a:buAutoNum type="arabicPeriod"/>
-            </a:pPr>
-            <a:r>
-              <a:rPr lang="en-US" sz="1100" dirty="0" smtClean="0"/>
-              <a:t>Able to play the video</a:t>
-            </a:r>
-            <a:endParaRPr lang="en-US" sz="1100" dirty="0" smtClean="0"/>
-          </a:p>
-          <a:p>
-            <a:pPr marL="228600" indent="-228600">
-              <a:buFont typeface="+mj-lt"/>
-              <a:buAutoNum type="arabicPeriod"/>
-            </a:pPr>
-            <a:r>
-              <a:rPr lang="en-US" sz="1100" dirty="0" smtClean="0"/>
-              <a:t>De space where you can see the videos</a:t>
-            </a:r>
-          </a:p>
-          <a:p>
-            <a:pPr marL="228600" indent="-228600">
-              <a:buFont typeface="+mj-lt"/>
-              <a:buAutoNum type="arabicPeriod"/>
-            </a:pPr>
-            <a:r>
-              <a:rPr lang="en-US" sz="1100" dirty="0" smtClean="0"/>
-              <a:t>De space were you can see what will be visible by the detector</a:t>
-            </a:r>
-          </a:p>
-          <a:p>
-            <a:pPr marL="228600" indent="-228600">
-              <a:buFont typeface="+mj-lt"/>
-              <a:buAutoNum type="arabicPeriod"/>
-            </a:pPr>
-            <a:r>
-              <a:rPr lang="en-US" sz="1100" dirty="0" smtClean="0"/>
-              <a:t>The table with the output (which is not used yet)</a:t>
-            </a:r>
-          </a:p>
-          <a:p>
-            <a:pPr marL="228600" indent="-228600">
-              <a:buNone/>
-            </a:pPr>
-            <a:endParaRPr lang="en-US" sz="1100" smtClean="0"/>
-          </a:p>
-          <a:p>
-            <a:pPr marL="228600" indent="-228600">
-              <a:buNone/>
-            </a:pPr>
-            <a:endParaRPr lang="en-US" sz="1100" dirty="0" smtClean="0"/>
-          </a:p>
-          <a:p>
-            <a:pPr marL="228600" indent="-228600">
-              <a:buNone/>
-            </a:pPr>
-            <a:endParaRPr lang="en-US" sz="1100" dirty="0" smtClean="0"/>
+              <a:t>the values of our thresholds and using other ways to segment the image. </a:t>
+            </a:r>
+            <a:endParaRPr lang="en-US" sz="1100" dirty="0"/>
           </a:p>
         </p:txBody>
       </p:sp>
@@ -4690,8 +4656,8 @@
         </p:nvSpPr>
         <p:spPr>
           <a:xfrm>
-            <a:off x="8461027" y="1260202"/>
-            <a:ext cx="3744416" cy="720080"/>
+            <a:off x="9667412" y="1656259"/>
+            <a:ext cx="4279333" cy="864096"/>
           </a:xfrm>
         </p:spPr>
         <p:txBody>
@@ -4704,163 +4670,7 @@
               <a:buNone/>
             </a:pPr>
             <a:r>
-              <a:rPr lang="nl-NL" sz="3200" dirty="0" err="1" smtClean="0">
-                <a:ln w="10160">
-                  <a:solidFill>
-                    <a:schemeClr val="accent1"/>
-                  </a:solidFill>
-                  <a:prstDash val="solid"/>
-                </a:ln>
-                <a:solidFill>
-                  <a:srgbClr val="FFFFFF"/>
-                </a:solidFill>
-                <a:effectLst>
-                  <a:outerShdw blurRad="38100" dist="32000" dir="5400000" algn="tl">
-                    <a:srgbClr val="000000">
-                      <a:alpha val="30000"/>
-                    </a:srgbClr>
-                  </a:outerShdw>
-                </a:effectLst>
-              </a:rPr>
-              <a:t>Title</a:t>
-            </a:r>
-            <a:endParaRPr lang="nl-NL" sz="3200" dirty="0">
-              <a:ln w="10160">
-                <a:solidFill>
-                  <a:schemeClr val="accent1"/>
-                </a:solidFill>
-                <a:prstDash val="solid"/>
-              </a:ln>
-              <a:solidFill>
-                <a:srgbClr val="FFFFFF"/>
-              </a:solidFill>
-              <a:effectLst>
-                <a:outerShdw blurRad="38100" dist="32000" dir="5400000" algn="tl">
-                  <a:srgbClr val="000000">
-                    <a:alpha val="30000"/>
-                  </a:srgbClr>
-                </a:outerShdw>
-              </a:effectLst>
-            </a:endParaRPr>
-          </a:p>
-        </p:txBody>
-      </p:sp>
-      <p:sp>
-        <p:nvSpPr>
-          <p:cNvPr id="16" name="Ondertitel 2"/>
-          <p:cNvSpPr>
-            <a:spLocks noGrp="1"/>
-          </p:cNvSpPr>
-          <p:nvPr>
-            <p:ph sz="quarter" idx="13"/>
-          </p:nvPr>
-        </p:nvSpPr>
-        <p:spPr>
-          <a:xfrm>
-            <a:off x="8461027" y="1908274"/>
-            <a:ext cx="3744416" cy="5472608"/>
-          </a:xfrm>
-          <a:ln/>
-        </p:spPr>
-        <p:style>
-          <a:lnRef idx="2">
-            <a:schemeClr val="accent2"/>
-          </a:lnRef>
-          <a:fillRef idx="1">
-            <a:schemeClr val="lt1"/>
-          </a:fillRef>
-          <a:effectRef idx="0">
-            <a:schemeClr val="accent2"/>
-          </a:effectRef>
-          <a:fontRef idx="minor">
-            <a:schemeClr val="dk1"/>
-          </a:fontRef>
-        </p:style>
-        <p:txBody>
-          <a:bodyPr>
-            <a:normAutofit/>
-          </a:bodyPr>
-          <a:lstStyle/>
-          <a:p>
-            <a:pPr marL="0" indent="0">
-              <a:buNone/>
-            </a:pPr>
-            <a:r>
-              <a:rPr lang="nl-NL" sz="1100" dirty="0" err="1" smtClean="0"/>
-              <a:t>Text</a:t>
-            </a:r>
-            <a:endParaRPr lang="nl-NL" sz="1100" dirty="0"/>
-          </a:p>
-        </p:txBody>
-      </p:sp>
-      <p:pic>
-        <p:nvPicPr>
-          <p:cNvPr id="1026" name="Picture 2" descr="http://project.3me.tudelft.nl/2013/wb70/tudelftlogo.jpg"/>
-          <p:cNvPicPr>
-            <a:picLocks noChangeAspect="1" noChangeArrowheads="1"/>
-          </p:cNvPicPr>
-          <p:nvPr/>
-        </p:nvPicPr>
-        <p:blipFill>
-          <a:blip r:embed="rId2" cstate="print">
-            <a:extLst>
-              <a:ext uri="{28A0092B-C50C-407E-A947-70E740481C1C}">
-                <a14:useLocalDpi xmlns="" xmlns:a14="http://schemas.microsoft.com/office/drawing/2010/main" val="0"/>
-              </a:ext>
-            </a:extLst>
-          </a:blip>
-          <a:srcRect/>
-          <a:stretch>
-            <a:fillRect/>
-          </a:stretch>
-        </p:blipFill>
-        <p:spPr bwMode="auto">
-          <a:xfrm>
-            <a:off x="8749059" y="7884938"/>
-            <a:ext cx="3754537" cy="1005183"/>
-          </a:xfrm>
-          <a:prstGeom prst="rect">
-            <a:avLst/>
-          </a:prstGeom>
-          <a:noFill/>
-          <a:extLst>
-            <a:ext uri="{909E8E84-426E-40DD-AFC4-6F175D3DCCD1}">
-              <a14:hiddenFill xmlns="" xmlns:a14="http://schemas.microsoft.com/office/drawing/2010/main">
-                <a:solidFill>
-                  <a:srgbClr val="FFFFFF"/>
-                </a:solidFill>
-              </a14:hiddenFill>
-            </a:ext>
-          </a:extLst>
-        </p:spPr>
-      </p:pic>
-      <p:sp>
-        <p:nvSpPr>
-          <p:cNvPr id="21" name="Ondertitel 2"/>
-          <p:cNvSpPr>
-            <a:spLocks noGrp="1"/>
-          </p:cNvSpPr>
-          <p:nvPr>
-            <p:ph sz="quarter" idx="13"/>
-          </p:nvPr>
-        </p:nvSpPr>
-        <p:spPr>
-          <a:xfrm>
-            <a:off x="4507085" y="1836266"/>
-            <a:ext cx="3744416" cy="648072"/>
-          </a:xfrm>
-        </p:spPr>
-        <p:txBody>
-          <a:bodyPr>
-            <a:normAutofit/>
-          </a:bodyPr>
-          <a:lstStyle/>
-          <a:p>
-            <a:pPr marL="0" indent="0">
-              <a:buNone/>
-            </a:pPr>
-            <a:r>
-              <a:rPr lang="nl-NL" sz="3200" dirty="0" smtClean="0">
+              <a:rPr lang="en-US" sz="3700" dirty="0" smtClean="0">
                 <a:ln w="10160">
                   <a:solidFill>
                     <a:schemeClr val="accent1"/>
@@ -4880,7 +4690,7 @@
               </a:rPr>
               <a:t>GUI</a:t>
             </a:r>
-            <a:endParaRPr lang="nl-NL" sz="3200" dirty="0">
+            <a:endParaRPr lang="en-US" sz="3700" dirty="0">
               <a:ln w="10160">
                 <a:solidFill>
                   <a:schemeClr val="accent1"/>
@@ -4901,6 +4711,193 @@
           </a:p>
         </p:txBody>
       </p:sp>
+      <p:sp>
+        <p:nvSpPr>
+          <p:cNvPr id="16" name="Ondertitel 2"/>
+          <p:cNvSpPr>
+            <a:spLocks noGrp="1"/>
+          </p:cNvSpPr>
+          <p:nvPr>
+            <p:ph sz="quarter" idx="13"/>
+          </p:nvPr>
+        </p:nvSpPr>
+        <p:spPr>
+          <a:xfrm>
+            <a:off x="9669745" y="2289929"/>
+            <a:ext cx="4279333" cy="4416762"/>
+          </a:xfrm>
+          <a:ln/>
+        </p:spPr>
+        <p:style>
+          <a:lnRef idx="2">
+            <a:schemeClr val="accent2"/>
+          </a:lnRef>
+          <a:fillRef idx="1">
+            <a:schemeClr val="lt1"/>
+          </a:fillRef>
+          <a:effectRef idx="0">
+            <a:schemeClr val="accent2"/>
+          </a:effectRef>
+          <a:fontRef idx="minor">
+            <a:schemeClr val="dk1"/>
+          </a:fontRef>
+        </p:style>
+        <p:txBody>
+          <a:bodyPr>
+            <a:normAutofit/>
+          </a:bodyPr>
+          <a:lstStyle/>
+          <a:p>
+            <a:pPr marL="0" indent="0">
+              <a:buNone/>
+            </a:pPr>
+            <a:r>
+              <a:rPr lang="en-US" sz="1100" dirty="0"/>
+              <a:t>The Graphical User Interface is important to let the user navigate efficiently through all the options our software has to offer. Up until this point we have implemented buttons to let the user import a video file and to start the video processing. </a:t>
+            </a:r>
+          </a:p>
+          <a:p>
+            <a:pPr marL="0" indent="0">
+              <a:buNone/>
+            </a:pPr>
+            <a:r>
+              <a:rPr lang="en-US" sz="1100" dirty="0"/>
+              <a:t>We also let the user know which frame is currently being processed and how long the processing took so far in total. The list on the right of the video does not currently have any function, but we will use it to display the recognized license plates in future versions. </a:t>
+            </a:r>
+          </a:p>
+          <a:p>
+            <a:pPr marL="0" indent="0">
+              <a:buNone/>
+            </a:pPr>
+            <a:r>
+              <a:rPr lang="en-US" sz="1100" dirty="0"/>
+              <a:t>We created the GUI with </a:t>
+            </a:r>
+            <a:r>
+              <a:rPr lang="en-US" sz="1100" dirty="0" err="1"/>
+              <a:t>MatLab’s</a:t>
+            </a:r>
+            <a:r>
+              <a:rPr lang="en-US" sz="1100" dirty="0"/>
+              <a:t> GUIDE tool which allows us to easily modify the GUI with very little effort. Here is a screenshot of our program for the first iteration:</a:t>
+            </a:r>
+          </a:p>
+          <a:p>
+            <a:pPr marL="0" indent="0">
+              <a:buNone/>
+            </a:pPr>
+            <a:endParaRPr lang="nl-NL" sz="1100" dirty="0" smtClean="0"/>
+          </a:p>
+        </p:txBody>
+      </p:sp>
+      <p:pic>
+        <p:nvPicPr>
+          <p:cNvPr id="1026" name="Picture 2" descr="http://project.3me.tudelft.nl/2013/wb70/tudelftlogo.jpg"/>
+          <p:cNvPicPr>
+            <a:picLocks noChangeAspect="1" noChangeArrowheads="1"/>
+          </p:cNvPicPr>
+          <p:nvPr/>
+        </p:nvPicPr>
+        <p:blipFill>
+          <a:blip r:embed="rId2" cstate="print">
+            <a:extLst>
+              <a:ext uri="{28A0092B-C50C-407E-A947-70E740481C1C}">
+                <a14:useLocalDpi xmlns:a14="http://schemas.microsoft.com/office/drawing/2010/main" val="0"/>
+              </a:ext>
+            </a:extLst>
+          </a:blip>
+          <a:srcRect/>
+          <a:stretch>
+            <a:fillRect/>
+          </a:stretch>
+        </p:blipFill>
+        <p:spPr bwMode="auto">
+          <a:xfrm>
+            <a:off x="10873308" y="9707724"/>
+            <a:ext cx="3416516" cy="960421"/>
+          </a:xfrm>
+          <a:prstGeom prst="rect">
+            <a:avLst/>
+          </a:prstGeom>
+          <a:noFill/>
+          <a:extLst>
+            <a:ext uri="{909E8E84-426E-40DD-AFC4-6F175D3DCCD1}">
+              <a14:hiddenFill xmlns:a14="http://schemas.microsoft.com/office/drawing/2010/main">
+                <a:solidFill>
+                  <a:srgbClr val="FFFFFF"/>
+                </a:solidFill>
+              </a14:hiddenFill>
+            </a:ext>
+          </a:extLst>
+        </p:spPr>
+      </p:pic>
+      <p:sp>
+        <p:nvSpPr>
+          <p:cNvPr id="21" name="Ondertitel 2"/>
+          <p:cNvSpPr>
+            <a:spLocks noGrp="1"/>
+          </p:cNvSpPr>
+          <p:nvPr>
+            <p:ph sz="quarter" idx="13"/>
+          </p:nvPr>
+        </p:nvSpPr>
+        <p:spPr>
+          <a:xfrm>
+            <a:off x="5160536" y="2184538"/>
+            <a:ext cx="4279333" cy="777686"/>
+          </a:xfrm>
+        </p:spPr>
+        <p:txBody>
+          <a:bodyPr>
+            <a:normAutofit/>
+          </a:bodyPr>
+          <a:lstStyle/>
+          <a:p>
+            <a:pPr marL="0" indent="0">
+              <a:buNone/>
+            </a:pPr>
+            <a:r>
+              <a:rPr lang="en-US" sz="3700" dirty="0">
+                <a:ln w="10160">
+                  <a:solidFill>
+                    <a:schemeClr val="accent1"/>
+                  </a:solidFill>
+                  <a:prstDash val="solid"/>
+                </a:ln>
+                <a:solidFill>
+                  <a:srgbClr val="FFFFFF"/>
+                </a:solidFill>
+                <a:effectLst>
+                  <a:outerShdw blurRad="38100" dist="32000" dir="5400000" algn="tl">
+                    <a:srgbClr val="000000">
+                      <a:alpha val="30000"/>
+                    </a:srgbClr>
+                  </a:outerShdw>
+                </a:effectLst>
+              </a:rPr>
+              <a:t>Segmentation</a:t>
+            </a:r>
+            <a:endParaRPr lang="en-US" sz="3700" dirty="0">
+              <a:ln w="10160">
+                <a:solidFill>
+                  <a:schemeClr val="accent1"/>
+                </a:solidFill>
+                <a:prstDash val="solid"/>
+              </a:ln>
+              <a:solidFill>
+                <a:srgbClr val="FFFFFF"/>
+              </a:solidFill>
+              <a:effectLst>
+                <a:outerShdw blurRad="38100" dist="32000" dir="5400000" algn="tl">
+                  <a:srgbClr val="000000">
+                    <a:alpha val="30000"/>
+                  </a:srgbClr>
+                </a:outerShdw>
+              </a:effectLst>
+            </a:endParaRPr>
+          </a:p>
+        </p:txBody>
+      </p:sp>
       <p:cxnSp>
         <p:nvCxnSpPr>
           <p:cNvPr id="22" name="Rechte verbindingslijn 21"/>
@@ -4909,8 +4906,8 @@
         </p:nvCxnSpPr>
         <p:spPr>
           <a:xfrm>
-            <a:off x="540147" y="1836266"/>
-            <a:ext cx="3744416" cy="0"/>
+            <a:off x="617311" y="2203519"/>
+            <a:ext cx="4279333" cy="0"/>
           </a:xfrm>
           <a:prstGeom prst="line">
             <a:avLst/>
@@ -4940,8 +4937,8 @@
         </p:nvCxnSpPr>
         <p:spPr>
           <a:xfrm>
-            <a:off x="4515469" y="2412330"/>
-            <a:ext cx="3744416" cy="0"/>
+            <a:off x="5160536" y="2808387"/>
+            <a:ext cx="4279333" cy="0"/>
           </a:xfrm>
           <a:prstGeom prst="line">
             <a:avLst/>
@@ -4971,8 +4968,8 @@
         </p:nvCxnSpPr>
         <p:spPr>
           <a:xfrm>
-            <a:off x="8461027" y="1908274"/>
-            <a:ext cx="3744416" cy="0"/>
+            <a:off x="9669745" y="2289929"/>
+            <a:ext cx="4279333" cy="0"/>
           </a:xfrm>
           <a:prstGeom prst="line">
             <a:avLst/>
@@ -5006,13 +5003,13 @@
         </p:nvSpPr>
         <p:spPr>
           <a:xfrm>
-            <a:off x="540148" y="5364658"/>
-            <a:ext cx="3744416" cy="499556"/>
+            <a:off x="638297" y="5472683"/>
+            <a:ext cx="4279333" cy="599467"/>
           </a:xfrm>
         </p:spPr>
         <p:txBody>
           <a:bodyPr>
-            <a:normAutofit fontScale="92500" lnSpcReduction="20000"/>
+            <a:normAutofit fontScale="92500" lnSpcReduction="10000"/>
           </a:bodyPr>
           <a:lstStyle/>
           <a:p>
@@ -5020,7 +5017,7 @@
               <a:buNone/>
             </a:pPr>
             <a:r>
-              <a:rPr lang="en-US" sz="3200" dirty="0" smtClean="0">
+              <a:rPr lang="en-US" sz="3700" dirty="0">
                 <a:ln w="10160">
                   <a:solidFill>
                     <a:schemeClr val="accent1"/>
@@ -5040,7 +5037,7 @@
               </a:rPr>
               <a:t>Project requirements</a:t>
             </a:r>
-            <a:endParaRPr lang="nl-NL" sz="3200" dirty="0" smtClean="0">
+            <a:endParaRPr lang="nl-NL" sz="3700" dirty="0">
               <a:ln w="10160">
                 <a:solidFill>
                   <a:schemeClr val="accent1"/>
@@ -5063,7 +5060,7 @@
             <a:pPr marL="0" indent="0">
               <a:buNone/>
             </a:pPr>
-            <a:endParaRPr lang="nl-NL" sz="3200" dirty="0">
+            <a:endParaRPr lang="nl-NL" sz="3700" dirty="0">
               <a:ln w="10160">
                 <a:solidFill>
                   <a:schemeClr val="accent1"/>
@@ -5096,8 +5093,8 @@
         </p:nvSpPr>
         <p:spPr>
           <a:xfrm>
-            <a:off x="552599" y="5796706"/>
-            <a:ext cx="3744416" cy="2376264"/>
+            <a:off x="631542" y="6048748"/>
+            <a:ext cx="4279333" cy="2160239"/>
           </a:xfrm>
           <a:ln/>
         </p:spPr>
@@ -5117,7 +5114,7 @@
         </p:style>
         <p:txBody>
           <a:bodyPr>
-            <a:normAutofit/>
+            <a:normAutofit lnSpcReduction="10000"/>
           </a:bodyPr>
           <a:lstStyle/>
           <a:p>
@@ -5125,88 +5122,152 @@
               <a:buNone/>
             </a:pPr>
             <a:r>
+              <a:rPr lang="en-US" sz="1100" dirty="0"/>
+              <a:t>There are several requirements for this projects:</a:t>
+            </a:r>
+            <a:endParaRPr lang="nl-NL" sz="1100" dirty="0"/>
+          </a:p>
+          <a:p>
+            <a:pPr>
+              <a:buFont typeface="Arial" panose="020B0604020202020204" pitchFamily="34" charset="0"/>
+              <a:buChar char="•"/>
+            </a:pPr>
+            <a:r>
               <a:rPr lang="en-US" sz="1100" dirty="0" smtClean="0"/>
-              <a:t>There are several requirements for this projects:</a:t>
-            </a:r>
-            <a:endParaRPr lang="nl-NL" sz="1100" dirty="0" smtClean="0"/>
-          </a:p>
-          <a:p>
-            <a:pPr marL="0" indent="0">
-              <a:buFont typeface="Arial" pitchFamily="34" charset="0"/>
+              <a:t>We </a:t>
+            </a:r>
+            <a:r>
+              <a:rPr lang="en-US" sz="1100" dirty="0"/>
+              <a:t>need  to be able to read  a </a:t>
+            </a:r>
+            <a:r>
+              <a:rPr lang="en-US" sz="1100" dirty="0" smtClean="0"/>
+              <a:t>large amount </a:t>
+            </a:r>
+            <a:r>
+              <a:rPr lang="en-US" sz="1100" dirty="0"/>
+              <a:t>of license plates </a:t>
+            </a:r>
+            <a:r>
+              <a:rPr lang="en-US" sz="1100" dirty="0" smtClean="0"/>
+              <a:t>from a </a:t>
+            </a:r>
+            <a:r>
+              <a:rPr lang="en-US" sz="1100" dirty="0"/>
+              <a:t>video with our </a:t>
+            </a:r>
+            <a:r>
+              <a:rPr lang="en-US" sz="1100" dirty="0" smtClean="0"/>
+              <a:t>application.</a:t>
+            </a:r>
+            <a:endParaRPr lang="en-US" sz="1100" dirty="0"/>
+          </a:p>
+          <a:p>
+            <a:pPr>
+              <a:buFont typeface="Arial" panose="020B0604020202020204" pitchFamily="34" charset="0"/>
               <a:buChar char="•"/>
             </a:pPr>
             <a:r>
               <a:rPr lang="en-US" sz="1100" dirty="0" smtClean="0"/>
-              <a:t> We need  to be able to read  a high amount of license plates of a video with our application</a:t>
-            </a:r>
-          </a:p>
-          <a:p>
-            <a:pPr marL="0" indent="0">
-              <a:buFont typeface="Arial" pitchFamily="34" charset="0"/>
-              <a:buChar char="•"/>
-            </a:pPr>
-            <a:r>
-              <a:rPr lang="en-US" sz="1100" dirty="0" smtClean="0"/>
-              <a:t> This application must be written in </a:t>
+              <a:t>This </a:t>
+            </a:r>
+            <a:r>
+              <a:rPr lang="en-US" sz="1100" dirty="0"/>
+              <a:t>application must be written in </a:t>
             </a:r>
             <a:r>
               <a:rPr lang="en-US" sz="1100" dirty="0" err="1" smtClean="0"/>
-              <a:t>M</a:t>
-            </a:r>
-            <a:r>
-              <a:rPr lang="en-US" sz="1100" dirty="0" err="1" smtClean="0"/>
-              <a:t>atlab</a:t>
-            </a:r>
-            <a:r>
-              <a:rPr lang="en-US" sz="1100" dirty="0" smtClean="0"/>
-              <a:t> with the use of the GUI–tool guide. </a:t>
-            </a:r>
-          </a:p>
-          <a:p>
-            <a:pPr marL="0" indent="0">
-              <a:buFont typeface="Arial" pitchFamily="34" charset="0"/>
-              <a:buChar char="•"/>
-            </a:pPr>
+              <a:t>MatLab</a:t>
+            </a:r>
             <a:r>
               <a:rPr lang="en-US" sz="1100" dirty="0" smtClean="0"/>
               <a:t> </a:t>
             </a:r>
             <a:r>
+              <a:rPr lang="en-US" sz="1100" dirty="0"/>
+              <a:t>with the use of the GUI–tool </a:t>
+            </a:r>
+            <a:r>
               <a:rPr lang="en-US" sz="1100" dirty="0" smtClean="0"/>
-              <a:t>The GUI for our application should consist of the video to detect from, the current time and frame, the possibility to load a video and a table with output of the detector</a:t>
-            </a:r>
-          </a:p>
-          <a:p>
-            <a:pPr marL="0" indent="0">
-              <a:buFont typeface="Arial" pitchFamily="34" charset="0"/>
+              <a:t>named GUIDE and </a:t>
+            </a:r>
+            <a:r>
+              <a:rPr lang="en-US" sz="1100" dirty="0" err="1" smtClean="0"/>
+              <a:t>DIPimage</a:t>
+            </a:r>
+            <a:r>
+              <a:rPr lang="en-US" sz="1100" dirty="0" smtClean="0"/>
+              <a:t>. </a:t>
+            </a:r>
+            <a:endParaRPr lang="en-US" sz="1100" dirty="0"/>
+          </a:p>
+          <a:p>
+            <a:pPr>
+              <a:buFont typeface="Arial" panose="020B0604020202020204" pitchFamily="34" charset="0"/>
               <a:buChar char="•"/>
             </a:pPr>
             <a:r>
               <a:rPr lang="en-US" sz="1100" dirty="0" smtClean="0"/>
-              <a:t> </a:t>
-            </a:r>
+              <a:t>The </a:t>
+            </a:r>
+            <a:r>
+              <a:rPr lang="en-US" sz="1100" dirty="0"/>
+              <a:t>GUI for our application should consist of the video to detect from, the current time and frame, the possibility to load a video and a table with output of the detector</a:t>
+            </a:r>
+          </a:p>
+          <a:p>
+            <a:pPr>
+              <a:buFont typeface="Arial" panose="020B0604020202020204" pitchFamily="34" charset="0"/>
+              <a:buChar char="•"/>
+            </a:pPr>
             <a:r>
               <a:rPr lang="en-US" sz="1100" dirty="0" smtClean="0"/>
-              <a:t>This output table should write down: the license plate number, frame number and the timestamp</a:t>
-            </a:r>
-          </a:p>
-          <a:p>
-            <a:pPr marL="0" indent="0">
-              <a:buFont typeface="Arial" pitchFamily="34" charset="0"/>
+              <a:t>This </a:t>
+            </a:r>
+            <a:r>
+              <a:rPr lang="en-US" sz="1100" dirty="0"/>
+              <a:t>output table should </a:t>
+            </a:r>
+            <a:r>
+              <a:rPr lang="en-US" sz="1100" dirty="0" smtClean="0"/>
+              <a:t>contain </a:t>
+            </a:r>
+            <a:r>
+              <a:rPr lang="en-US" sz="1100" dirty="0"/>
+              <a:t>the license plate number, frame number and the </a:t>
+            </a:r>
+            <a:r>
+              <a:rPr lang="en-US" sz="1100" dirty="0" smtClean="0"/>
+              <a:t>timestamp when it is detected.</a:t>
+            </a:r>
+            <a:endParaRPr lang="en-US" sz="1100" dirty="0"/>
+          </a:p>
+          <a:p>
+            <a:pPr>
+              <a:buFont typeface="Arial" panose="020B0604020202020204" pitchFamily="34" charset="0"/>
               <a:buChar char="•"/>
             </a:pPr>
             <a:r>
               <a:rPr lang="en-US" sz="1100" dirty="0" smtClean="0"/>
-              <a:t> The </a:t>
-            </a:r>
-            <a:r>
-              <a:rPr lang="en-US" sz="1100" dirty="0" err="1" smtClean="0"/>
-              <a:t>dectection</a:t>
+              <a:t>The detection </a:t>
+            </a:r>
+            <a:r>
+              <a:rPr lang="en-US" sz="1100" dirty="0"/>
+              <a:t>of those license plates should </a:t>
             </a:r>
             <a:r>
               <a:rPr lang="en-US" sz="1100" dirty="0" smtClean="0"/>
-              <a:t> of those license plates should on the right frames  and the right time</a:t>
-            </a:r>
+              <a:t>be on </a:t>
+            </a:r>
+            <a:r>
+              <a:rPr lang="en-US" sz="1100" dirty="0"/>
+              <a:t>the right frames  and the right </a:t>
+            </a:r>
+            <a:r>
+              <a:rPr lang="en-US" sz="1100" dirty="0" smtClean="0"/>
+              <a:t>time.</a:t>
+            </a:r>
+            <a:endParaRPr lang="en-US" sz="1100" dirty="0"/>
           </a:p>
         </p:txBody>
       </p:sp>
@@ -5218,8 +5279,8 @@
         </p:nvCxnSpPr>
         <p:spPr>
           <a:xfrm>
-            <a:off x="552598" y="5796706"/>
-            <a:ext cx="3744416" cy="0"/>
+            <a:off x="638297" y="6048747"/>
+            <a:ext cx="4279333" cy="0"/>
           </a:xfrm>
           <a:prstGeom prst="line">
             <a:avLst/>
@@ -5257,8 +5318,8 @@
         </p:blipFill>
         <p:spPr>
           <a:xfrm>
-            <a:off x="612155" y="2772370"/>
-            <a:ext cx="3539116" cy="720080"/>
+            <a:off x="1258536" y="3126455"/>
+            <a:ext cx="2990036" cy="638780"/>
           </a:xfrm>
           <a:prstGeom prst="rect">
             <a:avLst/>
@@ -5281,18 +5342,594 @@
         </p:blipFill>
         <p:spPr>
           <a:xfrm>
-            <a:off x="684163" y="4572570"/>
-            <a:ext cx="3512581" cy="648072"/>
+            <a:off x="1307356" y="4611701"/>
+            <a:ext cx="2941216" cy="569788"/>
           </a:xfrm>
           <a:prstGeom prst="rect">
             <a:avLst/>
           </a:prstGeom>
         </p:spPr>
       </p:pic>
+      <p:sp>
+        <p:nvSpPr>
+          <p:cNvPr id="2" name="Tekstvak 1"/>
+          <p:cNvSpPr txBox="1"/>
+          <p:nvPr/>
+        </p:nvSpPr>
+        <p:spPr>
+          <a:xfrm>
+            <a:off x="12745517" y="144091"/>
+            <a:ext cx="1544308" cy="584775"/>
+          </a:xfrm>
+          <a:prstGeom prst="rect">
+            <a:avLst/>
+          </a:prstGeom>
+          <a:noFill/>
+        </p:spPr>
+        <p:txBody>
+          <a:bodyPr wrap="square" rtlCol="0">
+            <a:spAutoFit/>
+          </a:bodyPr>
+          <a:lstStyle/>
+          <a:p>
+            <a:r>
+              <a:rPr lang="nl-NL" sz="3200" b="1" dirty="0" smtClean="0">
+                <a:ln w="900" cmpd="sng">
+                  <a:solidFill>
+                    <a:schemeClr val="accent1">
+                      <a:satMod val="190000"/>
+                      <a:alpha val="55000"/>
+                    </a:schemeClr>
+                  </a:solidFill>
+                  <a:prstDash val="solid"/>
+                </a:ln>
+                <a:solidFill>
+                  <a:schemeClr val="accent1">
+                    <a:satMod val="200000"/>
+                    <a:tint val="3000"/>
+                  </a:schemeClr>
+                </a:solidFill>
+                <a:effectLst>
+                  <a:innerShdw blurRad="101600" dist="76200" dir="5400000">
+                    <a:schemeClr val="accent1">
+                      <a:satMod val="190000"/>
+                      <a:tint val="100000"/>
+                      <a:alpha val="74000"/>
+                    </a:schemeClr>
+                  </a:innerShdw>
+                </a:effectLst>
+              </a:rPr>
+              <a:t>Week 1</a:t>
+            </a:r>
+            <a:endParaRPr lang="nl-NL" sz="3200" b="1" dirty="0">
+              <a:ln w="900" cmpd="sng">
+                <a:solidFill>
+                  <a:schemeClr val="accent1">
+                    <a:satMod val="190000"/>
+                    <a:alpha val="55000"/>
+                  </a:schemeClr>
+                </a:solidFill>
+                <a:prstDash val="solid"/>
+              </a:ln>
+              <a:solidFill>
+                <a:schemeClr val="accent1">
+                  <a:satMod val="200000"/>
+                  <a:tint val="3000"/>
+                </a:schemeClr>
+              </a:solidFill>
+              <a:effectLst>
+                <a:innerShdw blurRad="101600" dist="76200" dir="5400000">
+                  <a:schemeClr val="accent1">
+                    <a:satMod val="190000"/>
+                    <a:tint val="100000"/>
+                    <a:alpha val="74000"/>
+                  </a:schemeClr>
+                </a:innerShdw>
+              </a:effectLst>
+            </a:endParaRPr>
+          </a:p>
+        </p:txBody>
+      </p:sp>
+      <p:sp>
+        <p:nvSpPr>
+          <p:cNvPr id="28" name="Ondertitel 2"/>
+          <p:cNvSpPr>
+            <a:spLocks noGrp="1"/>
+          </p:cNvSpPr>
+          <p:nvPr>
+            <p:ph sz="quarter" idx="13"/>
+          </p:nvPr>
+        </p:nvSpPr>
+        <p:spPr>
+          <a:xfrm>
+            <a:off x="638297" y="8408851"/>
+            <a:ext cx="4279333" cy="599467"/>
+          </a:xfrm>
+        </p:spPr>
+        <p:txBody>
+          <a:bodyPr>
+            <a:normAutofit fontScale="92500" lnSpcReduction="10000"/>
+          </a:bodyPr>
+          <a:lstStyle/>
+          <a:p>
+            <a:pPr marL="0" indent="0">
+              <a:buNone/>
+            </a:pPr>
+            <a:r>
+              <a:rPr lang="nl-NL" sz="3700" dirty="0" err="1" smtClean="0">
+                <a:ln w="10160">
+                  <a:solidFill>
+                    <a:schemeClr val="accent1"/>
+                  </a:solidFill>
+                  <a:prstDash val="solid"/>
+                </a:ln>
+                <a:solidFill>
+                  <a:srgbClr val="FFFFFF"/>
+                </a:solidFill>
+                <a:effectLst>
+                  <a:outerShdw blurRad="38100" dist="32000" dir="5400000" algn="tl">
+                    <a:srgbClr val="000000">
+                      <a:alpha val="30000"/>
+                    </a:srgbClr>
+                  </a:outerShdw>
+                </a:effectLst>
+              </a:rPr>
+              <a:t>This</a:t>
+            </a:r>
+            <a:r>
+              <a:rPr lang="nl-NL" sz="3700" dirty="0" smtClean="0">
+                <a:ln w="10160">
+                  <a:solidFill>
+                    <a:schemeClr val="accent1"/>
+                  </a:solidFill>
+                  <a:prstDash val="solid"/>
+                </a:ln>
+                <a:solidFill>
+                  <a:srgbClr val="FFFFFF"/>
+                </a:solidFill>
+                <a:effectLst>
+                  <a:outerShdw blurRad="38100" dist="32000" dir="5400000" algn="tl">
+                    <a:srgbClr val="000000">
+                      <a:alpha val="30000"/>
+                    </a:srgbClr>
+                  </a:outerShdw>
+                </a:effectLst>
+              </a:rPr>
+              <a:t> Iteration</a:t>
+            </a:r>
+            <a:endParaRPr lang="nl-NL" sz="3700" dirty="0">
+              <a:ln w="10160">
+                <a:solidFill>
+                  <a:schemeClr val="accent1"/>
+                </a:solidFill>
+                <a:prstDash val="solid"/>
+              </a:ln>
+              <a:solidFill>
+                <a:srgbClr val="FFFFFF"/>
+              </a:solidFill>
+              <a:effectLst>
+                <a:outerShdw blurRad="38100" dist="32000" dir="5400000" algn="tl">
+                  <a:srgbClr val="000000">
+                    <a:alpha val="30000"/>
+                  </a:srgbClr>
+                </a:outerShdw>
+              </a:effectLst>
+            </a:endParaRPr>
+          </a:p>
+          <a:p>
+            <a:pPr marL="0" indent="0">
+              <a:buNone/>
+            </a:pPr>
+            <a:endParaRPr lang="nl-NL" sz="3700" dirty="0">
+              <a:ln w="10160">
+                <a:solidFill>
+                  <a:schemeClr val="accent1"/>
+                </a:solidFill>
+                <a:prstDash val="solid"/>
+              </a:ln>
+              <a:solidFill>
+                <a:srgbClr val="FFFFFF"/>
+              </a:solidFill>
+              <a:effectLst>
+                <a:outerShdw blurRad="38100" dist="32000" dir="5400000" algn="tl">
+                  <a:srgbClr val="000000">
+                    <a:alpha val="30000"/>
+                  </a:srgbClr>
+                </a:outerShdw>
+              </a:effectLst>
+            </a:endParaRPr>
+          </a:p>
+        </p:txBody>
+      </p:sp>
+      <p:sp>
+        <p:nvSpPr>
+          <p:cNvPr id="29" name="Ondertitel 2"/>
+          <p:cNvSpPr>
+            <a:spLocks noGrp="1"/>
+          </p:cNvSpPr>
+          <p:nvPr>
+            <p:ph sz="quarter" idx="13"/>
+          </p:nvPr>
+        </p:nvSpPr>
+        <p:spPr>
+          <a:xfrm>
+            <a:off x="631542" y="8984917"/>
+            <a:ext cx="4279333" cy="1683230"/>
+          </a:xfrm>
+          <a:ln/>
+        </p:spPr>
+        <p:style>
+          <a:lnRef idx="2">
+            <a:schemeClr val="accent2"/>
+          </a:lnRef>
+          <a:fillRef idx="1">
+            <a:schemeClr val="lt1"/>
+          </a:fillRef>
+          <a:effectRef idx="0">
+            <a:schemeClr val="accent2"/>
+          </a:effectRef>
+          <a:fontRef idx="minor">
+            <a:schemeClr val="dk1"/>
+          </a:fontRef>
+        </p:style>
+        <p:txBody>
+          <a:bodyPr>
+            <a:normAutofit/>
+          </a:bodyPr>
+          <a:lstStyle/>
+          <a:p>
+            <a:pPr marL="0" indent="0">
+              <a:buNone/>
+            </a:pPr>
+            <a:r>
+              <a:rPr lang="en-US" sz="1100" dirty="0"/>
+              <a:t>This week we </a:t>
+            </a:r>
+            <a:r>
+              <a:rPr lang="en-US" sz="1100" dirty="0" smtClean="0"/>
+              <a:t>focused on creating a basic structure from where we can advance in the next iterations. We created a basic Graphical User Interface (GUI) and started with segmenting the license plates from the background from frames of a video, which are all described </a:t>
+            </a:r>
+            <a:r>
+              <a:rPr lang="en-US" sz="1100" dirty="0"/>
+              <a:t>in more detail in the next parts of the poster. </a:t>
+            </a:r>
+          </a:p>
+        </p:txBody>
+      </p:sp>
+      <p:cxnSp>
+        <p:nvCxnSpPr>
+          <p:cNvPr id="30" name="Rechte verbindingslijn 29"/>
+          <p:cNvCxnSpPr/>
+          <p:nvPr/>
+        </p:nvCxnSpPr>
+        <p:spPr>
+          <a:xfrm>
+            <a:off x="638297" y="8984915"/>
+            <a:ext cx="4279333" cy="0"/>
+          </a:xfrm>
+          <a:prstGeom prst="line">
+            <a:avLst/>
+          </a:prstGeom>
+          <a:ln w="76200"/>
+        </p:spPr>
+        <p:style>
+          <a:lnRef idx="1">
+            <a:schemeClr val="accent1"/>
+          </a:lnRef>
+          <a:fillRef idx="0">
+            <a:schemeClr val="accent1"/>
+          </a:fillRef>
+          <a:effectRef idx="0">
+            <a:schemeClr val="accent1"/>
+          </a:effectRef>
+          <a:fontRef idx="minor">
+            <a:schemeClr val="tx1"/>
+          </a:fontRef>
+        </p:style>
+      </p:cxnSp>
+      <p:sp>
+        <p:nvSpPr>
+          <p:cNvPr id="34" name="Ondertitel 2"/>
+          <p:cNvSpPr>
+            <a:spLocks noGrp="1"/>
+          </p:cNvSpPr>
+          <p:nvPr>
+            <p:ph sz="quarter" idx="13"/>
+          </p:nvPr>
+        </p:nvSpPr>
+        <p:spPr>
+          <a:xfrm>
+            <a:off x="9669745" y="6696819"/>
+            <a:ext cx="4279333" cy="864096"/>
+          </a:xfrm>
+        </p:spPr>
+        <p:txBody>
+          <a:bodyPr>
+            <a:normAutofit/>
+          </a:bodyPr>
+          <a:lstStyle/>
+          <a:p>
+            <a:pPr marL="0" indent="0">
+              <a:buNone/>
+            </a:pPr>
+            <a:r>
+              <a:rPr lang="nl-NL" sz="3700" dirty="0" smtClean="0">
+                <a:ln w="10160">
+                  <a:solidFill>
+                    <a:schemeClr val="accent1"/>
+                  </a:solidFill>
+                  <a:prstDash val="solid"/>
+                </a:ln>
+                <a:solidFill>
+                  <a:srgbClr val="FFFFFF"/>
+                </a:solidFill>
+                <a:effectLst>
+                  <a:outerShdw blurRad="38100" dist="32000" dir="5400000" algn="tl">
+                    <a:srgbClr val="000000">
+                      <a:alpha val="30000"/>
+                    </a:srgbClr>
+                  </a:outerShdw>
+                </a:effectLst>
+              </a:rPr>
+              <a:t>Next Iteration</a:t>
+            </a:r>
+            <a:endParaRPr lang="nl-NL" sz="3700" dirty="0">
+              <a:ln w="10160">
+                <a:solidFill>
+                  <a:schemeClr val="accent1"/>
+                </a:solidFill>
+                <a:prstDash val="solid"/>
+              </a:ln>
+              <a:solidFill>
+                <a:srgbClr val="FFFFFF"/>
+              </a:solidFill>
+              <a:effectLst>
+                <a:outerShdw blurRad="38100" dist="32000" dir="5400000" algn="tl">
+                  <a:srgbClr val="000000">
+                    <a:alpha val="30000"/>
+                  </a:srgbClr>
+                </a:outerShdw>
+              </a:effectLst>
+            </a:endParaRPr>
+          </a:p>
+        </p:txBody>
+      </p:sp>
+      <p:sp>
+        <p:nvSpPr>
+          <p:cNvPr id="35" name="Ondertitel 2"/>
+          <p:cNvSpPr>
+            <a:spLocks noGrp="1"/>
+          </p:cNvSpPr>
+          <p:nvPr>
+            <p:ph sz="quarter" idx="13"/>
+          </p:nvPr>
+        </p:nvSpPr>
+        <p:spPr>
+          <a:xfrm>
+            <a:off x="9669745" y="7326918"/>
+            <a:ext cx="4279333" cy="1530141"/>
+          </a:xfrm>
+          <a:ln/>
+        </p:spPr>
+        <p:style>
+          <a:lnRef idx="2">
+            <a:schemeClr val="accent2"/>
+          </a:lnRef>
+          <a:fillRef idx="1">
+            <a:schemeClr val="lt1"/>
+          </a:fillRef>
+          <a:effectRef idx="0">
+            <a:schemeClr val="accent2"/>
+          </a:effectRef>
+          <a:fontRef idx="minor">
+            <a:schemeClr val="dk1"/>
+          </a:fontRef>
+        </p:style>
+        <p:txBody>
+          <a:bodyPr>
+            <a:normAutofit/>
+          </a:bodyPr>
+          <a:lstStyle/>
+          <a:p>
+            <a:pPr marL="0" indent="0">
+              <a:buNone/>
+            </a:pPr>
+            <a:r>
+              <a:rPr lang="en-US" sz="1100" dirty="0" smtClean="0"/>
+              <a:t>For the next iteration we hope to complete the following tasks:</a:t>
+            </a:r>
+          </a:p>
+          <a:p>
+            <a:pPr>
+              <a:buFont typeface="Arial" panose="020B0604020202020204" pitchFamily="34" charset="0"/>
+              <a:buChar char="•"/>
+            </a:pPr>
+            <a:r>
+              <a:rPr lang="en-US" sz="1100" dirty="0" smtClean="0"/>
+              <a:t>Finish segmenting the frames</a:t>
+            </a:r>
+          </a:p>
+          <a:p>
+            <a:pPr>
+              <a:buFont typeface="Arial" panose="020B0604020202020204" pitchFamily="34" charset="0"/>
+              <a:buChar char="•"/>
+            </a:pPr>
+            <a:r>
+              <a:rPr lang="en-US" sz="1100" dirty="0" smtClean="0"/>
+              <a:t>Finding and tracking the license plates</a:t>
+            </a:r>
+          </a:p>
+          <a:p>
+            <a:pPr>
+              <a:buFont typeface="Arial" panose="020B0604020202020204" pitchFamily="34" charset="0"/>
+              <a:buChar char="•"/>
+            </a:pPr>
+            <a:r>
+              <a:rPr lang="en-US" sz="1100" dirty="0" smtClean="0"/>
+              <a:t>Basic character recognition</a:t>
+            </a:r>
+            <a:endParaRPr lang="en-US" sz="1100" dirty="0"/>
+          </a:p>
+        </p:txBody>
+      </p:sp>
+      <p:cxnSp>
+        <p:nvCxnSpPr>
+          <p:cNvPr id="36" name="Rechte verbindingslijn 35"/>
+          <p:cNvCxnSpPr/>
+          <p:nvPr/>
+        </p:nvCxnSpPr>
+        <p:spPr>
+          <a:xfrm>
+            <a:off x="9669744" y="7326918"/>
+            <a:ext cx="4279333" cy="0"/>
+          </a:xfrm>
+          <a:prstGeom prst="line">
+            <a:avLst/>
+          </a:prstGeom>
+          <a:ln w="76200"/>
+        </p:spPr>
+        <p:style>
+          <a:lnRef idx="1">
+            <a:schemeClr val="accent1"/>
+          </a:lnRef>
+          <a:fillRef idx="0">
+            <a:schemeClr val="accent1"/>
+          </a:fillRef>
+          <a:effectRef idx="0">
+            <a:schemeClr val="accent1"/>
+          </a:effectRef>
+          <a:fontRef idx="minor">
+            <a:schemeClr val="tx1"/>
+          </a:fontRef>
+        </p:style>
+      </p:cxnSp>
+      <p:pic>
+        <p:nvPicPr>
+          <p:cNvPr id="6" name="Picture 2" descr="http://puu.sh/dAjTm/99966ff1b6.jpg"/>
+          <p:cNvPicPr>
+            <a:picLocks noChangeAspect="1" noChangeArrowheads="1"/>
+          </p:cNvPicPr>
+          <p:nvPr/>
+        </p:nvPicPr>
+        <p:blipFill>
+          <a:blip r:embed="rId5">
+            <a:extLst>
+              <a:ext uri="{28A0092B-C50C-407E-A947-70E740481C1C}">
+                <a14:useLocalDpi xmlns:a14="http://schemas.microsoft.com/office/drawing/2010/main" val="0"/>
+              </a:ext>
+            </a:extLst>
+          </a:blip>
+          <a:srcRect/>
+          <a:stretch>
+            <a:fillRect/>
+          </a:stretch>
+        </p:blipFill>
+        <p:spPr bwMode="auto">
+          <a:xfrm>
+            <a:off x="9886146" y="4320555"/>
+            <a:ext cx="3846530" cy="2386136"/>
+          </a:xfrm>
+          <a:prstGeom prst="rect">
+            <a:avLst/>
+          </a:prstGeom>
+          <a:noFill/>
+          <a:extLst>
+            <a:ext uri="{909E8E84-426E-40DD-AFC4-6F175D3DCCD1}">
+              <a14:hiddenFill xmlns:a14="http://schemas.microsoft.com/office/drawing/2010/main">
+                <a:solidFill>
+                  <a:srgbClr val="FFFFFF"/>
+                </a:solidFill>
+              </a14:hiddenFill>
+            </a:ext>
+          </a:extLst>
+        </p:spPr>
+      </p:pic>
+      <p:pic>
+        <p:nvPicPr>
+          <p:cNvPr id="1028" name="Picture 4" descr="https://lh5.googleusercontent.com/FbZAUxYaBMMlt_uinylV8Ysxgp0UxDr14_ClZr78whaE-H8V6BcLFbK8nR80tbxkYS8o_IsYlZUkjJ3H6gkNojmstf0BGV5DIlcC8hja0g474zpAZdhNUY_cxhXDv3w83A"/>
+          <p:cNvPicPr>
+            <a:picLocks noChangeAspect="1" noChangeArrowheads="1"/>
+          </p:cNvPicPr>
+          <p:nvPr/>
+        </p:nvPicPr>
+        <p:blipFill>
+          <a:blip r:embed="rId6">
+            <a:extLst>
+              <a:ext uri="{28A0092B-C50C-407E-A947-70E740481C1C}">
+                <a14:useLocalDpi xmlns:a14="http://schemas.microsoft.com/office/drawing/2010/main" val="0"/>
+              </a:ext>
+            </a:extLst>
+          </a:blip>
+          <a:srcRect/>
+          <a:stretch>
+            <a:fillRect/>
+          </a:stretch>
+        </p:blipFill>
+        <p:spPr bwMode="auto">
+          <a:xfrm>
+            <a:off x="5203355" y="3740542"/>
+            <a:ext cx="4138428" cy="2888482"/>
+          </a:xfrm>
+          <a:prstGeom prst="rect">
+            <a:avLst/>
+          </a:prstGeom>
+          <a:noFill/>
+          <a:extLst>
+            <a:ext uri="{909E8E84-426E-40DD-AFC4-6F175D3DCCD1}">
+              <a14:hiddenFill xmlns:a14="http://schemas.microsoft.com/office/drawing/2010/main">
+                <a:solidFill>
+                  <a:srgbClr val="FFFFFF"/>
+                </a:solidFill>
+              </a14:hiddenFill>
+            </a:ext>
+          </a:extLst>
+        </p:spPr>
+      </p:pic>
+      <p:pic>
+        <p:nvPicPr>
+          <p:cNvPr id="1030" name="Picture 6" descr="http://puu.sh/dAoaE/00259cabcf.png"/>
+          <p:cNvPicPr>
+            <a:picLocks noChangeAspect="1" noChangeArrowheads="1"/>
+          </p:cNvPicPr>
+          <p:nvPr/>
+        </p:nvPicPr>
+        <p:blipFill>
+          <a:blip r:embed="rId7">
+            <a:extLst>
+              <a:ext uri="{28A0092B-C50C-407E-A947-70E740481C1C}">
+                <a14:useLocalDpi xmlns:a14="http://schemas.microsoft.com/office/drawing/2010/main" val="0"/>
+              </a:ext>
+            </a:extLst>
+          </a:blip>
+          <a:srcRect/>
+          <a:stretch>
+            <a:fillRect/>
+          </a:stretch>
+        </p:blipFill>
+        <p:spPr bwMode="auto">
+          <a:xfrm>
+            <a:off x="5267875" y="7488907"/>
+            <a:ext cx="4073908" cy="2367270"/>
+          </a:xfrm>
+          <a:prstGeom prst="rect">
+            <a:avLst/>
+          </a:prstGeom>
+          <a:noFill/>
+          <a:extLst>
+            <a:ext uri="{909E8E84-426E-40DD-AFC4-6F175D3DCCD1}">
+              <a14:hiddenFill xmlns:a14="http://schemas.microsoft.com/office/drawing/2010/main">
+                <a:solidFill>
+                  <a:srgbClr val="FFFFFF"/>
+                </a:solidFill>
+              </a14:hiddenFill>
+            </a:ext>
+          </a:extLst>
+        </p:spPr>
+      </p:pic>
     </p:spTree>
     <p:extLst>
       <p:ext uri="{BB962C8B-B14F-4D97-AF65-F5344CB8AC3E}">
-        <p14:creationId xmlns="" xmlns:p14="http://schemas.microsoft.com/office/powerpoint/2010/main" val="2651525738"/>
+        <p14:creationId xmlns:p14="http://schemas.microsoft.com/office/powerpoint/2010/main" val="2651525738"/>
       </p:ext>
     </p:extLst>
   </p:cSld>

</xml_diff>